<commit_message>
Inclusão de explicação detalhada do site
</commit_message>
<xml_diff>
--- a/protótipo_projeto_integrador_grupo03_07fev2024.pptx
+++ b/protótipo_projeto_integrador_grupo03_07fev2024.pptx
@@ -6,6 +6,9 @@
   </p:sldMasterIdLst>
   <p:sldIdLst>
     <p:sldId id="258" r:id="rId2"/>
+    <p:sldId id="259" r:id="rId3"/>
+    <p:sldId id="260" r:id="rId4"/>
+    <p:sldId id="261" r:id="rId5"/>
   </p:sldIdLst>
   <p:sldSz cx="12192000" cy="6858000"/>
   <p:notesSz cx="6858000" cy="9144000"/>
@@ -259,9 +262,9 @@
           <a:p>
             <a:fld id="{EB8733A9-2373-4631-A6BF-6CB217376283}" type="datetimeFigureOut">
               <a:rPr lang="pt-BR" smtClean="0"/>
-              <a:t>07/02/2024</a:t>
+              <a:t>08/02/2024</a:t>
             </a:fld>
-            <a:endParaRPr lang="pt-BR"/>
+            <a:endParaRPr lang="pt-BR" dirty="0"/>
           </a:p>
         </p:txBody>
       </p:sp>
@@ -286,7 +289,7 @@
           <a:bodyPr/>
           <a:lstStyle/>
           <a:p>
-            <a:endParaRPr lang="pt-BR"/>
+            <a:endParaRPr lang="pt-BR" dirty="0"/>
           </a:p>
         </p:txBody>
       </p:sp>
@@ -315,7 +318,7 @@
               <a:rPr lang="pt-BR" smtClean="0"/>
               <a:t>‹nº›</a:t>
             </a:fld>
-            <a:endParaRPr lang="pt-BR"/>
+            <a:endParaRPr lang="pt-BR" dirty="0"/>
           </a:p>
         </p:txBody>
       </p:sp>
@@ -457,9 +460,9 @@
           <a:p>
             <a:fld id="{EB8733A9-2373-4631-A6BF-6CB217376283}" type="datetimeFigureOut">
               <a:rPr lang="pt-BR" smtClean="0"/>
-              <a:t>07/02/2024</a:t>
+              <a:t>08/02/2024</a:t>
             </a:fld>
-            <a:endParaRPr lang="pt-BR"/>
+            <a:endParaRPr lang="pt-BR" dirty="0"/>
           </a:p>
         </p:txBody>
       </p:sp>
@@ -484,7 +487,7 @@
           <a:bodyPr/>
           <a:lstStyle/>
           <a:p>
-            <a:endParaRPr lang="pt-BR"/>
+            <a:endParaRPr lang="pt-BR" dirty="0"/>
           </a:p>
         </p:txBody>
       </p:sp>
@@ -513,7 +516,7 @@
               <a:rPr lang="pt-BR" smtClean="0"/>
               <a:t>‹nº›</a:t>
             </a:fld>
-            <a:endParaRPr lang="pt-BR"/>
+            <a:endParaRPr lang="pt-BR" dirty="0"/>
           </a:p>
         </p:txBody>
       </p:sp>
@@ -665,9 +668,9 @@
           <a:p>
             <a:fld id="{EB8733A9-2373-4631-A6BF-6CB217376283}" type="datetimeFigureOut">
               <a:rPr lang="pt-BR" smtClean="0"/>
-              <a:t>07/02/2024</a:t>
+              <a:t>08/02/2024</a:t>
             </a:fld>
-            <a:endParaRPr lang="pt-BR"/>
+            <a:endParaRPr lang="pt-BR" dirty="0"/>
           </a:p>
         </p:txBody>
       </p:sp>
@@ -692,7 +695,7 @@
           <a:bodyPr/>
           <a:lstStyle/>
           <a:p>
-            <a:endParaRPr lang="pt-BR"/>
+            <a:endParaRPr lang="pt-BR" dirty="0"/>
           </a:p>
         </p:txBody>
       </p:sp>
@@ -721,7 +724,7 @@
               <a:rPr lang="pt-BR" smtClean="0"/>
               <a:t>‹nº›</a:t>
             </a:fld>
-            <a:endParaRPr lang="pt-BR"/>
+            <a:endParaRPr lang="pt-BR" dirty="0"/>
           </a:p>
         </p:txBody>
       </p:sp>
@@ -863,9 +866,9 @@
           <a:p>
             <a:fld id="{EB8733A9-2373-4631-A6BF-6CB217376283}" type="datetimeFigureOut">
               <a:rPr lang="pt-BR" smtClean="0"/>
-              <a:t>07/02/2024</a:t>
+              <a:t>08/02/2024</a:t>
             </a:fld>
-            <a:endParaRPr lang="pt-BR"/>
+            <a:endParaRPr lang="pt-BR" dirty="0"/>
           </a:p>
         </p:txBody>
       </p:sp>
@@ -890,7 +893,7 @@
           <a:bodyPr/>
           <a:lstStyle/>
           <a:p>
-            <a:endParaRPr lang="pt-BR"/>
+            <a:endParaRPr lang="pt-BR" dirty="0"/>
           </a:p>
         </p:txBody>
       </p:sp>
@@ -919,7 +922,7 @@
               <a:rPr lang="pt-BR" smtClean="0"/>
               <a:t>‹nº›</a:t>
             </a:fld>
-            <a:endParaRPr lang="pt-BR"/>
+            <a:endParaRPr lang="pt-BR" dirty="0"/>
           </a:p>
         </p:txBody>
       </p:sp>
@@ -1138,9 +1141,9 @@
           <a:p>
             <a:fld id="{EB8733A9-2373-4631-A6BF-6CB217376283}" type="datetimeFigureOut">
               <a:rPr lang="pt-BR" smtClean="0"/>
-              <a:t>07/02/2024</a:t>
+              <a:t>08/02/2024</a:t>
             </a:fld>
-            <a:endParaRPr lang="pt-BR"/>
+            <a:endParaRPr lang="pt-BR" dirty="0"/>
           </a:p>
         </p:txBody>
       </p:sp>
@@ -1165,7 +1168,7 @@
           <a:bodyPr/>
           <a:lstStyle/>
           <a:p>
-            <a:endParaRPr lang="pt-BR"/>
+            <a:endParaRPr lang="pt-BR" dirty="0"/>
           </a:p>
         </p:txBody>
       </p:sp>
@@ -1194,7 +1197,7 @@
               <a:rPr lang="pt-BR" smtClean="0"/>
               <a:t>‹nº›</a:t>
             </a:fld>
-            <a:endParaRPr lang="pt-BR"/>
+            <a:endParaRPr lang="pt-BR" dirty="0"/>
           </a:p>
         </p:txBody>
       </p:sp>
@@ -1403,9 +1406,9 @@
           <a:p>
             <a:fld id="{EB8733A9-2373-4631-A6BF-6CB217376283}" type="datetimeFigureOut">
               <a:rPr lang="pt-BR" smtClean="0"/>
-              <a:t>07/02/2024</a:t>
+              <a:t>08/02/2024</a:t>
             </a:fld>
-            <a:endParaRPr lang="pt-BR"/>
+            <a:endParaRPr lang="pt-BR" dirty="0"/>
           </a:p>
         </p:txBody>
       </p:sp>
@@ -1430,7 +1433,7 @@
           <a:bodyPr/>
           <a:lstStyle/>
           <a:p>
-            <a:endParaRPr lang="pt-BR"/>
+            <a:endParaRPr lang="pt-BR" dirty="0"/>
           </a:p>
         </p:txBody>
       </p:sp>
@@ -1459,7 +1462,7 @@
               <a:rPr lang="pt-BR" smtClean="0"/>
               <a:t>‹nº›</a:t>
             </a:fld>
-            <a:endParaRPr lang="pt-BR"/>
+            <a:endParaRPr lang="pt-BR" dirty="0"/>
           </a:p>
         </p:txBody>
       </p:sp>
@@ -1815,9 +1818,9 @@
           <a:p>
             <a:fld id="{EB8733A9-2373-4631-A6BF-6CB217376283}" type="datetimeFigureOut">
               <a:rPr lang="pt-BR" smtClean="0"/>
-              <a:t>07/02/2024</a:t>
+              <a:t>08/02/2024</a:t>
             </a:fld>
-            <a:endParaRPr lang="pt-BR"/>
+            <a:endParaRPr lang="pt-BR" dirty="0"/>
           </a:p>
         </p:txBody>
       </p:sp>
@@ -1842,7 +1845,7 @@
           <a:bodyPr/>
           <a:lstStyle/>
           <a:p>
-            <a:endParaRPr lang="pt-BR"/>
+            <a:endParaRPr lang="pt-BR" dirty="0"/>
           </a:p>
         </p:txBody>
       </p:sp>
@@ -1871,7 +1874,7 @@
               <a:rPr lang="pt-BR" smtClean="0"/>
               <a:t>‹nº›</a:t>
             </a:fld>
-            <a:endParaRPr lang="pt-BR"/>
+            <a:endParaRPr lang="pt-BR" dirty="0"/>
           </a:p>
         </p:txBody>
       </p:sp>
@@ -1956,9 +1959,9 @@
           <a:p>
             <a:fld id="{EB8733A9-2373-4631-A6BF-6CB217376283}" type="datetimeFigureOut">
               <a:rPr lang="pt-BR" smtClean="0"/>
-              <a:t>07/02/2024</a:t>
+              <a:t>08/02/2024</a:t>
             </a:fld>
-            <a:endParaRPr lang="pt-BR"/>
+            <a:endParaRPr lang="pt-BR" dirty="0"/>
           </a:p>
         </p:txBody>
       </p:sp>
@@ -1983,7 +1986,7 @@
           <a:bodyPr/>
           <a:lstStyle/>
           <a:p>
-            <a:endParaRPr lang="pt-BR"/>
+            <a:endParaRPr lang="pt-BR" dirty="0"/>
           </a:p>
         </p:txBody>
       </p:sp>
@@ -2012,7 +2015,7 @@
               <a:rPr lang="pt-BR" smtClean="0"/>
               <a:t>‹nº›</a:t>
             </a:fld>
-            <a:endParaRPr lang="pt-BR"/>
+            <a:endParaRPr lang="pt-BR" dirty="0"/>
           </a:p>
         </p:txBody>
       </p:sp>
@@ -2069,9 +2072,9 @@
           <a:p>
             <a:fld id="{EB8733A9-2373-4631-A6BF-6CB217376283}" type="datetimeFigureOut">
               <a:rPr lang="pt-BR" smtClean="0"/>
-              <a:t>07/02/2024</a:t>
+              <a:t>08/02/2024</a:t>
             </a:fld>
-            <a:endParaRPr lang="pt-BR"/>
+            <a:endParaRPr lang="pt-BR" dirty="0"/>
           </a:p>
         </p:txBody>
       </p:sp>
@@ -2096,7 +2099,7 @@
           <a:bodyPr/>
           <a:lstStyle/>
           <a:p>
-            <a:endParaRPr lang="pt-BR"/>
+            <a:endParaRPr lang="pt-BR" dirty="0"/>
           </a:p>
         </p:txBody>
       </p:sp>
@@ -2125,7 +2128,7 @@
               <a:rPr lang="pt-BR" smtClean="0"/>
               <a:t>‹nº›</a:t>
             </a:fld>
-            <a:endParaRPr lang="pt-BR"/>
+            <a:endParaRPr lang="pt-BR" dirty="0"/>
           </a:p>
         </p:txBody>
       </p:sp>
@@ -2380,9 +2383,9 @@
           <a:p>
             <a:fld id="{EB8733A9-2373-4631-A6BF-6CB217376283}" type="datetimeFigureOut">
               <a:rPr lang="pt-BR" smtClean="0"/>
-              <a:t>07/02/2024</a:t>
+              <a:t>08/02/2024</a:t>
             </a:fld>
-            <a:endParaRPr lang="pt-BR"/>
+            <a:endParaRPr lang="pt-BR" dirty="0"/>
           </a:p>
         </p:txBody>
       </p:sp>
@@ -2407,7 +2410,7 @@
           <a:bodyPr/>
           <a:lstStyle/>
           <a:p>
-            <a:endParaRPr lang="pt-BR"/>
+            <a:endParaRPr lang="pt-BR" dirty="0"/>
           </a:p>
         </p:txBody>
       </p:sp>
@@ -2436,7 +2439,7 @@
               <a:rPr lang="pt-BR" smtClean="0"/>
               <a:t>‹nº›</a:t>
             </a:fld>
-            <a:endParaRPr lang="pt-BR"/>
+            <a:endParaRPr lang="pt-BR" dirty="0"/>
           </a:p>
         </p:txBody>
       </p:sp>
@@ -2570,7 +2573,7 @@
             </a:lvl9pPr>
           </a:lstStyle>
           <a:p>
-            <a:endParaRPr lang="pt-BR"/>
+            <a:endParaRPr lang="pt-BR" dirty="0"/>
           </a:p>
         </p:txBody>
       </p:sp>
@@ -2668,9 +2671,9 @@
           <a:p>
             <a:fld id="{EB8733A9-2373-4631-A6BF-6CB217376283}" type="datetimeFigureOut">
               <a:rPr lang="pt-BR" smtClean="0"/>
-              <a:t>07/02/2024</a:t>
+              <a:t>08/02/2024</a:t>
             </a:fld>
-            <a:endParaRPr lang="pt-BR"/>
+            <a:endParaRPr lang="pt-BR" dirty="0"/>
           </a:p>
         </p:txBody>
       </p:sp>
@@ -2695,7 +2698,7 @@
           <a:bodyPr/>
           <a:lstStyle/>
           <a:p>
-            <a:endParaRPr lang="pt-BR"/>
+            <a:endParaRPr lang="pt-BR" dirty="0"/>
           </a:p>
         </p:txBody>
       </p:sp>
@@ -2724,7 +2727,7 @@
               <a:rPr lang="pt-BR" smtClean="0"/>
               <a:t>‹nº›</a:t>
             </a:fld>
-            <a:endParaRPr lang="pt-BR"/>
+            <a:endParaRPr lang="pt-BR" dirty="0"/>
           </a:p>
         </p:txBody>
       </p:sp>
@@ -2909,9 +2912,9 @@
           <a:p>
             <a:fld id="{EB8733A9-2373-4631-A6BF-6CB217376283}" type="datetimeFigureOut">
               <a:rPr lang="pt-BR" smtClean="0"/>
-              <a:t>07/02/2024</a:t>
+              <a:t>08/02/2024</a:t>
             </a:fld>
-            <a:endParaRPr lang="pt-BR"/>
+            <a:endParaRPr lang="pt-BR" dirty="0"/>
           </a:p>
         </p:txBody>
       </p:sp>
@@ -2954,7 +2957,7 @@
             </a:lvl1pPr>
           </a:lstStyle>
           <a:p>
-            <a:endParaRPr lang="pt-BR"/>
+            <a:endParaRPr lang="pt-BR" dirty="0"/>
           </a:p>
         </p:txBody>
       </p:sp>
@@ -3001,7 +3004,7 @@
               <a:rPr lang="pt-BR" smtClean="0"/>
               <a:t>‹nº›</a:t>
             </a:fld>
-            <a:endParaRPr lang="pt-BR"/>
+            <a:endParaRPr lang="pt-BR" dirty="0"/>
           </a:p>
         </p:txBody>
       </p:sp>
@@ -3817,399 +3820,7 @@
             <a:pPr algn="just"/>
             <a:r>
               <a:rPr lang="pt-BR" sz="2800" dirty="0"/>
-              <a:t>"</a:t>
-            </a:r>
-            <a:r>
-              <a:rPr lang="pt-BR" sz="2800" dirty="0" err="1"/>
-              <a:t>Lorem</a:t>
-            </a:r>
-            <a:r>
-              <a:rPr lang="pt-BR" sz="2800" dirty="0"/>
-              <a:t> ipsum </a:t>
-            </a:r>
-            <a:r>
-              <a:rPr lang="pt-BR" sz="2800" dirty="0" err="1"/>
-              <a:t>dolor</a:t>
-            </a:r>
-            <a:r>
-              <a:rPr lang="pt-BR" sz="2800" dirty="0"/>
-              <a:t> </a:t>
-            </a:r>
-            <a:r>
-              <a:rPr lang="pt-BR" sz="2800" dirty="0" err="1"/>
-              <a:t>sit</a:t>
-            </a:r>
-            <a:r>
-              <a:rPr lang="pt-BR" sz="2800" dirty="0"/>
-              <a:t> </a:t>
-            </a:r>
-            <a:r>
-              <a:rPr lang="pt-BR" sz="2800" dirty="0" err="1"/>
-              <a:t>amet</a:t>
-            </a:r>
-            <a:r>
-              <a:rPr lang="pt-BR" sz="2800" dirty="0"/>
-              <a:t>, </a:t>
-            </a:r>
-            <a:r>
-              <a:rPr lang="pt-BR" sz="2800" dirty="0" err="1"/>
-              <a:t>consectetur</a:t>
-            </a:r>
-            <a:r>
-              <a:rPr lang="pt-BR" sz="2800" dirty="0"/>
-              <a:t> </a:t>
-            </a:r>
-            <a:r>
-              <a:rPr lang="pt-BR" sz="2800" dirty="0" err="1"/>
-              <a:t>adipiscing</a:t>
-            </a:r>
-            <a:r>
-              <a:rPr lang="pt-BR" sz="2800" dirty="0"/>
-              <a:t> </a:t>
-            </a:r>
-            <a:r>
-              <a:rPr lang="pt-BR" sz="2800" dirty="0" err="1"/>
-              <a:t>elit</a:t>
-            </a:r>
-            <a:r>
-              <a:rPr lang="pt-BR" sz="2800" dirty="0"/>
-              <a:t>, </a:t>
-            </a:r>
-            <a:r>
-              <a:rPr lang="pt-BR" sz="2800" dirty="0" err="1"/>
-              <a:t>sed</a:t>
-            </a:r>
-            <a:r>
-              <a:rPr lang="pt-BR" sz="2800" dirty="0"/>
-              <a:t> do </a:t>
-            </a:r>
-            <a:r>
-              <a:rPr lang="pt-BR" sz="2800" dirty="0" err="1"/>
-              <a:t>eiusmod</a:t>
-            </a:r>
-            <a:r>
-              <a:rPr lang="pt-BR" sz="2800" dirty="0"/>
-              <a:t> </a:t>
-            </a:r>
-            <a:r>
-              <a:rPr lang="pt-BR" sz="2800" dirty="0" err="1"/>
-              <a:t>tempor</a:t>
-            </a:r>
-            <a:r>
-              <a:rPr lang="pt-BR" sz="2800" dirty="0"/>
-              <a:t> </a:t>
-            </a:r>
-            <a:r>
-              <a:rPr lang="pt-BR" sz="2800" dirty="0" err="1"/>
-              <a:t>incididunt</a:t>
-            </a:r>
-            <a:r>
-              <a:rPr lang="pt-BR" sz="2800" dirty="0"/>
-              <a:t> ut labore et </a:t>
-            </a:r>
-            <a:r>
-              <a:rPr lang="pt-BR" sz="2800" dirty="0" err="1"/>
-              <a:t>dolore</a:t>
-            </a:r>
-            <a:r>
-              <a:rPr lang="pt-BR" sz="2800" dirty="0"/>
-              <a:t> magna </a:t>
-            </a:r>
-            <a:r>
-              <a:rPr lang="pt-BR" sz="2800" dirty="0" err="1"/>
-              <a:t>aliqua</a:t>
-            </a:r>
-            <a:r>
-              <a:rPr lang="pt-BR" sz="2800" dirty="0"/>
-              <a:t>. Ut </a:t>
-            </a:r>
-            <a:r>
-              <a:rPr lang="pt-BR" sz="2800" dirty="0" err="1"/>
-              <a:t>enim</a:t>
-            </a:r>
-            <a:r>
-              <a:rPr lang="pt-BR" sz="2800" dirty="0"/>
-              <a:t> ad </a:t>
-            </a:r>
-            <a:r>
-              <a:rPr lang="pt-BR" sz="2800" dirty="0" err="1"/>
-              <a:t>minim</a:t>
-            </a:r>
-            <a:r>
-              <a:rPr lang="pt-BR" sz="2800" dirty="0"/>
-              <a:t> </a:t>
-            </a:r>
-            <a:r>
-              <a:rPr lang="pt-BR" sz="2800" dirty="0" err="1"/>
-              <a:t>veniam</a:t>
-            </a:r>
-            <a:r>
-              <a:rPr lang="pt-BR" sz="2800" dirty="0"/>
-              <a:t>, quis </a:t>
-            </a:r>
-            <a:r>
-              <a:rPr lang="pt-BR" sz="2800" dirty="0" err="1"/>
-              <a:t>nostrud</a:t>
-            </a:r>
-            <a:r>
-              <a:rPr lang="pt-BR" sz="2800" dirty="0"/>
-              <a:t> </a:t>
-            </a:r>
-            <a:r>
-              <a:rPr lang="pt-BR" sz="2800" dirty="0" err="1"/>
-              <a:t>exercitation</a:t>
-            </a:r>
-            <a:r>
-              <a:rPr lang="pt-BR" sz="2800" dirty="0"/>
-              <a:t> </a:t>
-            </a:r>
-            <a:r>
-              <a:rPr lang="pt-BR" sz="2800" dirty="0" err="1"/>
-              <a:t>ullamco</a:t>
-            </a:r>
-            <a:r>
-              <a:rPr lang="pt-BR" sz="2800" dirty="0"/>
-              <a:t> </a:t>
-            </a:r>
-            <a:r>
-              <a:rPr lang="pt-BR" sz="2800" dirty="0" err="1"/>
-              <a:t>laboris</a:t>
-            </a:r>
-            <a:r>
-              <a:rPr lang="pt-BR" sz="2800" dirty="0"/>
-              <a:t> </a:t>
-            </a:r>
-            <a:r>
-              <a:rPr lang="pt-BR" sz="2800" dirty="0" err="1"/>
-              <a:t>nisi</a:t>
-            </a:r>
-            <a:r>
-              <a:rPr lang="pt-BR" sz="2800" dirty="0"/>
-              <a:t> ut </a:t>
-            </a:r>
-            <a:r>
-              <a:rPr lang="pt-BR" sz="2800" dirty="0" err="1"/>
-              <a:t>aliquip</a:t>
-            </a:r>
-            <a:r>
-              <a:rPr lang="pt-BR" sz="2800" dirty="0"/>
-              <a:t> </a:t>
-            </a:r>
-            <a:r>
-              <a:rPr lang="pt-BR" sz="2800" dirty="0" err="1"/>
-              <a:t>ex</a:t>
-            </a:r>
-            <a:r>
-              <a:rPr lang="pt-BR" sz="2800" dirty="0"/>
-              <a:t> </a:t>
-            </a:r>
-            <a:r>
-              <a:rPr lang="pt-BR" sz="2800" dirty="0" err="1"/>
-              <a:t>ea</a:t>
-            </a:r>
-            <a:r>
-              <a:rPr lang="pt-BR" sz="2800" dirty="0"/>
-              <a:t> </a:t>
-            </a:r>
-            <a:r>
-              <a:rPr lang="pt-BR" sz="2800" dirty="0" err="1"/>
-              <a:t>commodo</a:t>
-            </a:r>
-            <a:r>
-              <a:rPr lang="pt-BR" sz="2800" dirty="0"/>
-              <a:t> </a:t>
-            </a:r>
-            <a:r>
-              <a:rPr lang="pt-BR" sz="2800" dirty="0" err="1"/>
-              <a:t>consequat</a:t>
-            </a:r>
-            <a:r>
-              <a:rPr lang="pt-BR" sz="2800" dirty="0"/>
-              <a:t>. </a:t>
-            </a:r>
-            <a:r>
-              <a:rPr lang="pt-BR" sz="2800" dirty="0" err="1"/>
-              <a:t>Duis</a:t>
-            </a:r>
-            <a:r>
-              <a:rPr lang="pt-BR" sz="2800" dirty="0"/>
-              <a:t> </a:t>
-            </a:r>
-            <a:r>
-              <a:rPr lang="pt-BR" sz="2800" dirty="0" err="1"/>
-              <a:t>aute</a:t>
-            </a:r>
-            <a:r>
-              <a:rPr lang="pt-BR" sz="2800" dirty="0"/>
-              <a:t> </a:t>
-            </a:r>
-            <a:r>
-              <a:rPr lang="pt-BR" sz="2800" dirty="0" err="1"/>
-              <a:t>irure</a:t>
-            </a:r>
-            <a:r>
-              <a:rPr lang="pt-BR" sz="2800" dirty="0"/>
-              <a:t> </a:t>
-            </a:r>
-            <a:r>
-              <a:rPr lang="pt-BR" sz="2800" dirty="0" err="1"/>
-              <a:t>dolor</a:t>
-            </a:r>
-            <a:r>
-              <a:rPr lang="pt-BR" sz="2800" dirty="0"/>
-              <a:t> in </a:t>
-            </a:r>
-            <a:r>
-              <a:rPr lang="pt-BR" sz="2800" dirty="0" err="1"/>
-              <a:t>reprehenderit</a:t>
-            </a:r>
-            <a:r>
-              <a:rPr lang="pt-BR" sz="2800" dirty="0"/>
-              <a:t> in </a:t>
-            </a:r>
-            <a:r>
-              <a:rPr lang="pt-BR" sz="2800" dirty="0" err="1"/>
-              <a:t>voluptate</a:t>
-            </a:r>
-            <a:r>
-              <a:rPr lang="pt-BR" sz="2800" dirty="0"/>
-              <a:t> </a:t>
-            </a:r>
-            <a:r>
-              <a:rPr lang="pt-BR" sz="2800" dirty="0" err="1"/>
-              <a:t>velit</a:t>
-            </a:r>
-            <a:r>
-              <a:rPr lang="pt-BR" sz="2800" dirty="0"/>
-              <a:t> esse </a:t>
-            </a:r>
-            <a:r>
-              <a:rPr lang="pt-BR" sz="2800" dirty="0" err="1"/>
-              <a:t>cillum</a:t>
-            </a:r>
-            <a:r>
-              <a:rPr lang="pt-BR" sz="2800" dirty="0"/>
-              <a:t> </a:t>
-            </a:r>
-            <a:r>
-              <a:rPr lang="pt-BR" sz="2800" dirty="0" err="1"/>
-              <a:t>dolore</a:t>
-            </a:r>
-            <a:r>
-              <a:rPr lang="pt-BR" sz="2800" dirty="0"/>
-              <a:t> eu </a:t>
-            </a:r>
-            <a:r>
-              <a:rPr lang="pt-BR" sz="2800" dirty="0" err="1"/>
-              <a:t>fugiat</a:t>
-            </a:r>
-            <a:r>
-              <a:rPr lang="pt-BR" sz="2800" dirty="0"/>
-              <a:t> </a:t>
-            </a:r>
-            <a:r>
-              <a:rPr lang="pt-BR" sz="2800" dirty="0" err="1"/>
-              <a:t>nulla</a:t>
-            </a:r>
-            <a:r>
-              <a:rPr lang="pt-BR" sz="2800" dirty="0"/>
-              <a:t> </a:t>
-            </a:r>
-            <a:r>
-              <a:rPr lang="pt-BR" sz="2800" dirty="0" err="1"/>
-              <a:t>pariatur</a:t>
-            </a:r>
-            <a:r>
-              <a:rPr lang="pt-BR" sz="2800" dirty="0"/>
-              <a:t>. </a:t>
-            </a:r>
-            <a:r>
-              <a:rPr lang="pt-BR" sz="2800" dirty="0" err="1"/>
-              <a:t>Excepteur</a:t>
-            </a:r>
-            <a:r>
-              <a:rPr lang="pt-BR" sz="2800" dirty="0"/>
-              <a:t> </a:t>
-            </a:r>
-            <a:r>
-              <a:rPr lang="pt-BR" sz="2800" dirty="0" err="1"/>
-              <a:t>sint</a:t>
-            </a:r>
-            <a:r>
-              <a:rPr lang="pt-BR" sz="2800" dirty="0"/>
-              <a:t> </a:t>
-            </a:r>
-            <a:r>
-              <a:rPr lang="pt-BR" sz="2800" dirty="0" err="1"/>
-              <a:t>occaecat</a:t>
-            </a:r>
-            <a:r>
-              <a:rPr lang="pt-BR" sz="2800" dirty="0"/>
-              <a:t> </a:t>
-            </a:r>
-            <a:r>
-              <a:rPr lang="pt-BR" sz="2800" dirty="0" err="1"/>
-              <a:t>cupidatat</a:t>
-            </a:r>
-            <a:r>
-              <a:rPr lang="pt-BR" sz="2800" dirty="0"/>
-              <a:t> non </a:t>
-            </a:r>
-            <a:r>
-              <a:rPr lang="pt-BR" sz="2800" dirty="0" err="1"/>
-              <a:t>proident</a:t>
-            </a:r>
-            <a:r>
-              <a:rPr lang="pt-BR" sz="2800" dirty="0"/>
-              <a:t>, sunt in culpa </a:t>
-            </a:r>
-            <a:r>
-              <a:rPr lang="pt-BR" sz="2800" dirty="0" err="1"/>
-              <a:t>qui</a:t>
-            </a:r>
-            <a:r>
-              <a:rPr lang="pt-BR" sz="2800" dirty="0"/>
-              <a:t> </a:t>
-            </a:r>
-            <a:r>
-              <a:rPr lang="pt-BR" sz="2800" dirty="0" err="1"/>
-              <a:t>officia</a:t>
-            </a:r>
-            <a:r>
-              <a:rPr lang="pt-BR" sz="2800" dirty="0"/>
-              <a:t> </a:t>
-            </a:r>
-            <a:r>
-              <a:rPr lang="pt-BR" sz="2800" dirty="0" err="1"/>
-              <a:t>deserunt</a:t>
-            </a:r>
-            <a:r>
-              <a:rPr lang="pt-BR" sz="2800" dirty="0"/>
-              <a:t> </a:t>
-            </a:r>
-            <a:r>
-              <a:rPr lang="pt-BR" sz="2800" dirty="0" err="1"/>
-              <a:t>mollit</a:t>
-            </a:r>
-            <a:r>
-              <a:rPr lang="pt-BR" sz="2800" dirty="0"/>
-              <a:t> </a:t>
-            </a:r>
-            <a:r>
-              <a:rPr lang="pt-BR" sz="2800" dirty="0" err="1"/>
-              <a:t>anim</a:t>
-            </a:r>
-            <a:r>
-              <a:rPr lang="pt-BR" sz="2800" dirty="0"/>
-              <a:t> id est </a:t>
-            </a:r>
-            <a:r>
-              <a:rPr lang="pt-BR" sz="2800" dirty="0" err="1"/>
-              <a:t>laborum</a:t>
-            </a:r>
-            <a:r>
-              <a:rPr lang="pt-BR" sz="2800" dirty="0"/>
-              <a:t>."</a:t>
+              <a:t>"Lorem ipsum dolor sit amet, consectetur adipiscing elit, sed do eiusmod tempor incididunt ut labore et dolore magna aliqua. Ut enim ad minim veniam, quis nostrud exercitation ullamco laboris nisi ut aliquip ex ea commodo consequat. Duis aute irure dolor in reprehenderit in voluptate velit esse cillum dolore eu fugiat nulla pariatur. Excepteur sint occaecat cupidatat non proident, sunt in culpa qui officia deserunt mollit anim id est laborum."</a:t>
             </a:r>
           </a:p>
         </p:txBody>
@@ -4347,7 +3958,7 @@
         <p:spPr>
           <a:xfrm>
             <a:off x="822390" y="6349817"/>
-            <a:ext cx="5513695" cy="400110"/>
+            <a:ext cx="11262220" cy="400110"/>
           </a:xfrm>
           <a:prstGeom prst="rect">
             <a:avLst/>
@@ -4362,7 +3973,7 @@
           <a:p>
             <a:r>
               <a:rPr lang="pt-BR" sz="2000" dirty="0"/>
-              <a:t>@celsoLuiz	@carinecorea	@danilosantos</a:t>
+              <a:t>@celsoLuiz		@carinecorea		@danilosantos		 @brenaalves</a:t>
             </a:r>
           </a:p>
         </p:txBody>
@@ -4536,6 +4147,2217 @@
     <p:extLst>
       <p:ext uri="{BB962C8B-B14F-4D97-AF65-F5344CB8AC3E}">
         <p14:creationId xmlns:p14="http://schemas.microsoft.com/office/powerpoint/2010/main" val="1722354788"/>
+      </p:ext>
+    </p:extLst>
+  </p:cSld>
+  <p:clrMapOvr>
+    <a:masterClrMapping/>
+  </p:clrMapOvr>
+</p:sld>
+</file>
+
+<file path=ppt/slides/slide2.xml><?xml version="1.0" encoding="utf-8"?>
+<p:sld xmlns:a="http://schemas.openxmlformats.org/drawingml/2006/main" xmlns:r="http://schemas.openxmlformats.org/officeDocument/2006/relationships" xmlns:p="http://schemas.openxmlformats.org/presentationml/2006/main">
+  <p:cSld>
+    <p:spTree>
+      <p:nvGrpSpPr>
+        <p:cNvPr id="1" name="">
+          <a:extLst>
+            <a:ext uri="{FF2B5EF4-FFF2-40B4-BE49-F238E27FC236}">
+              <a16:creationId xmlns:a16="http://schemas.microsoft.com/office/drawing/2014/main" id="{9DA5C5CE-9E81-9682-C5EC-570868CB230D}"/>
+            </a:ext>
+          </a:extLst>
+        </p:cNvPr>
+        <p:cNvGrpSpPr/>
+        <p:nvPr/>
+      </p:nvGrpSpPr>
+      <p:grpSpPr>
+        <a:xfrm>
+          <a:off x="0" y="0"/>
+          <a:ext cx="0" cy="0"/>
+          <a:chOff x="0" y="0"/>
+          <a:chExt cx="0" cy="0"/>
+        </a:xfrm>
+      </p:grpSpPr>
+      <p:pic>
+        <p:nvPicPr>
+          <p:cNvPr id="9" name="Imagem 8">
+            <a:extLst>
+              <a:ext uri="{FF2B5EF4-FFF2-40B4-BE49-F238E27FC236}">
+                <a16:creationId xmlns:a16="http://schemas.microsoft.com/office/drawing/2014/main" id="{E0FB1633-80BF-9A6F-2669-53909DD5F153}"/>
+              </a:ext>
+            </a:extLst>
+          </p:cNvPr>
+          <p:cNvPicPr>
+            <a:picLocks noChangeAspect="1"/>
+          </p:cNvPicPr>
+          <p:nvPr/>
+        </p:nvPicPr>
+        <p:blipFill rotWithShape="1">
+          <a:blip r:embed="rId2"/>
+          <a:srcRect r="65865"/>
+          <a:stretch/>
+        </p:blipFill>
+        <p:spPr>
+          <a:xfrm>
+            <a:off x="141973" y="142182"/>
+            <a:ext cx="3913836" cy="1876425"/>
+          </a:xfrm>
+          <a:prstGeom prst="rect">
+            <a:avLst/>
+          </a:prstGeom>
+        </p:spPr>
+      </p:pic>
+      <p:cxnSp>
+        <p:nvCxnSpPr>
+          <p:cNvPr id="19" name="Conector reto 18">
+            <a:extLst>
+              <a:ext uri="{FF2B5EF4-FFF2-40B4-BE49-F238E27FC236}">
+                <a16:creationId xmlns:a16="http://schemas.microsoft.com/office/drawing/2014/main" id="{E049E805-4697-4BBF-1F3D-269FF6CC35BE}"/>
+              </a:ext>
+            </a:extLst>
+          </p:cNvPr>
+          <p:cNvCxnSpPr>
+            <a:cxnSpLocks/>
+          </p:cNvCxnSpPr>
+          <p:nvPr/>
+        </p:nvCxnSpPr>
+        <p:spPr>
+          <a:xfrm>
+            <a:off x="3292742" y="1163844"/>
+            <a:ext cx="0" cy="322340"/>
+          </a:xfrm>
+          <a:prstGeom prst="line">
+            <a:avLst/>
+          </a:prstGeom>
+          <a:ln w="38100">
+            <a:solidFill>
+              <a:srgbClr val="C00000"/>
+            </a:solidFill>
+          </a:ln>
+        </p:spPr>
+        <p:style>
+          <a:lnRef idx="1">
+            <a:schemeClr val="accent1"/>
+          </a:lnRef>
+          <a:fillRef idx="0">
+            <a:schemeClr val="accent1"/>
+          </a:fillRef>
+          <a:effectRef idx="0">
+            <a:schemeClr val="accent1"/>
+          </a:effectRef>
+          <a:fontRef idx="minor">
+            <a:schemeClr val="tx1"/>
+          </a:fontRef>
+        </p:style>
+      </p:cxnSp>
+      <p:cxnSp>
+        <p:nvCxnSpPr>
+          <p:cNvPr id="20" name="Conector reto 19">
+            <a:extLst>
+              <a:ext uri="{FF2B5EF4-FFF2-40B4-BE49-F238E27FC236}">
+                <a16:creationId xmlns:a16="http://schemas.microsoft.com/office/drawing/2014/main" id="{B28A3530-AD52-E840-4627-9C4B0D7ACE13}"/>
+              </a:ext>
+            </a:extLst>
+          </p:cNvPr>
+          <p:cNvCxnSpPr/>
+          <p:nvPr/>
+        </p:nvCxnSpPr>
+        <p:spPr>
+          <a:xfrm>
+            <a:off x="3292742" y="1486184"/>
+            <a:ext cx="583096" cy="0"/>
+          </a:xfrm>
+          <a:prstGeom prst="line">
+            <a:avLst/>
+          </a:prstGeom>
+          <a:ln w="38100">
+            <a:solidFill>
+              <a:srgbClr val="C00000"/>
+            </a:solidFill>
+          </a:ln>
+        </p:spPr>
+        <p:style>
+          <a:lnRef idx="1">
+            <a:schemeClr val="accent1"/>
+          </a:lnRef>
+          <a:fillRef idx="0">
+            <a:schemeClr val="accent1"/>
+          </a:fillRef>
+          <a:effectRef idx="0">
+            <a:schemeClr val="accent1"/>
+          </a:effectRef>
+          <a:fontRef idx="minor">
+            <a:schemeClr val="tx1"/>
+          </a:fontRef>
+        </p:style>
+      </p:cxnSp>
+      <p:sp>
+        <p:nvSpPr>
+          <p:cNvPr id="21" name="CaixaDeTexto 20">
+            <a:extLst>
+              <a:ext uri="{FF2B5EF4-FFF2-40B4-BE49-F238E27FC236}">
+                <a16:creationId xmlns:a16="http://schemas.microsoft.com/office/drawing/2014/main" id="{C43DC398-F078-1C28-7BF4-6F1F79462DEE}"/>
+              </a:ext>
+            </a:extLst>
+          </p:cNvPr>
+          <p:cNvSpPr txBox="1"/>
+          <p:nvPr/>
+        </p:nvSpPr>
+        <p:spPr>
+          <a:xfrm>
+            <a:off x="3869210" y="1307279"/>
+            <a:ext cx="3525077" cy="369332"/>
+          </a:xfrm>
+          <a:prstGeom prst="rect">
+            <a:avLst/>
+          </a:prstGeom>
+          <a:noFill/>
+        </p:spPr>
+        <p:txBody>
+          <a:bodyPr wrap="square" rtlCol="0">
+            <a:spAutoFit/>
+          </a:bodyPr>
+          <a:lstStyle/>
+          <a:p>
+            <a:r>
+              <a:rPr lang="pt-BR" dirty="0"/>
+              <a:t>Logo para login acessar site da ONU</a:t>
+            </a:r>
+          </a:p>
+        </p:txBody>
+      </p:sp>
+      <p:cxnSp>
+        <p:nvCxnSpPr>
+          <p:cNvPr id="22" name="Conector reto 21">
+            <a:extLst>
+              <a:ext uri="{FF2B5EF4-FFF2-40B4-BE49-F238E27FC236}">
+                <a16:creationId xmlns:a16="http://schemas.microsoft.com/office/drawing/2014/main" id="{C363CCEB-08FE-D3BE-58BC-01D952BE33E8}"/>
+              </a:ext>
+            </a:extLst>
+          </p:cNvPr>
+          <p:cNvCxnSpPr>
+            <a:cxnSpLocks/>
+          </p:cNvCxnSpPr>
+          <p:nvPr/>
+        </p:nvCxnSpPr>
+        <p:spPr>
+          <a:xfrm>
+            <a:off x="1947644" y="1163844"/>
+            <a:ext cx="0" cy="726528"/>
+          </a:xfrm>
+          <a:prstGeom prst="line">
+            <a:avLst/>
+          </a:prstGeom>
+          <a:ln w="38100">
+            <a:solidFill>
+              <a:srgbClr val="C00000"/>
+            </a:solidFill>
+          </a:ln>
+        </p:spPr>
+        <p:style>
+          <a:lnRef idx="1">
+            <a:schemeClr val="accent1"/>
+          </a:lnRef>
+          <a:fillRef idx="0">
+            <a:schemeClr val="accent1"/>
+          </a:fillRef>
+          <a:effectRef idx="0">
+            <a:schemeClr val="accent1"/>
+          </a:effectRef>
+          <a:fontRef idx="minor">
+            <a:schemeClr val="tx1"/>
+          </a:fontRef>
+        </p:style>
+      </p:cxnSp>
+      <p:cxnSp>
+        <p:nvCxnSpPr>
+          <p:cNvPr id="25" name="Conector reto 24">
+            <a:extLst>
+              <a:ext uri="{FF2B5EF4-FFF2-40B4-BE49-F238E27FC236}">
+                <a16:creationId xmlns:a16="http://schemas.microsoft.com/office/drawing/2014/main" id="{F0192B0E-693B-D3EF-90AE-30E0602CC6E0}"/>
+              </a:ext>
+            </a:extLst>
+          </p:cNvPr>
+          <p:cNvCxnSpPr/>
+          <p:nvPr/>
+        </p:nvCxnSpPr>
+        <p:spPr>
+          <a:xfrm>
+            <a:off x="1947644" y="1890372"/>
+            <a:ext cx="583096" cy="0"/>
+          </a:xfrm>
+          <a:prstGeom prst="line">
+            <a:avLst/>
+          </a:prstGeom>
+          <a:ln w="38100">
+            <a:solidFill>
+              <a:srgbClr val="C00000"/>
+            </a:solidFill>
+          </a:ln>
+        </p:spPr>
+        <p:style>
+          <a:lnRef idx="1">
+            <a:schemeClr val="accent1"/>
+          </a:lnRef>
+          <a:fillRef idx="0">
+            <a:schemeClr val="accent1"/>
+          </a:fillRef>
+          <a:effectRef idx="0">
+            <a:schemeClr val="accent1"/>
+          </a:effectRef>
+          <a:fontRef idx="minor">
+            <a:schemeClr val="tx1"/>
+          </a:fontRef>
+        </p:style>
+      </p:cxnSp>
+      <p:sp>
+        <p:nvSpPr>
+          <p:cNvPr id="27" name="CaixaDeTexto 26">
+            <a:extLst>
+              <a:ext uri="{FF2B5EF4-FFF2-40B4-BE49-F238E27FC236}">
+                <a16:creationId xmlns:a16="http://schemas.microsoft.com/office/drawing/2014/main" id="{F6ECE537-E770-186B-37A4-01FDA7CE7CBB}"/>
+              </a:ext>
+            </a:extLst>
+          </p:cNvPr>
+          <p:cNvSpPr txBox="1"/>
+          <p:nvPr/>
+        </p:nvSpPr>
+        <p:spPr>
+          <a:xfrm>
+            <a:off x="2524112" y="1711467"/>
+            <a:ext cx="3525077" cy="369332"/>
+          </a:xfrm>
+          <a:prstGeom prst="rect">
+            <a:avLst/>
+          </a:prstGeom>
+          <a:noFill/>
+        </p:spPr>
+        <p:txBody>
+          <a:bodyPr wrap="square" rtlCol="0">
+            <a:spAutoFit/>
+          </a:bodyPr>
+          <a:lstStyle/>
+          <a:p>
+            <a:r>
+              <a:rPr lang="pt-BR" dirty="0"/>
+              <a:t>Logo para login acessar site da ODS</a:t>
+            </a:r>
+          </a:p>
+        </p:txBody>
+      </p:sp>
+      <p:cxnSp>
+        <p:nvCxnSpPr>
+          <p:cNvPr id="33" name="Conector reto 32">
+            <a:extLst>
+              <a:ext uri="{FF2B5EF4-FFF2-40B4-BE49-F238E27FC236}">
+                <a16:creationId xmlns:a16="http://schemas.microsoft.com/office/drawing/2014/main" id="{36AA3B91-6020-D061-CCB6-72C90D9284A2}"/>
+              </a:ext>
+            </a:extLst>
+          </p:cNvPr>
+          <p:cNvCxnSpPr>
+            <a:cxnSpLocks/>
+          </p:cNvCxnSpPr>
+          <p:nvPr/>
+        </p:nvCxnSpPr>
+        <p:spPr>
+          <a:xfrm>
+            <a:off x="761576" y="1163844"/>
+            <a:ext cx="0" cy="1143970"/>
+          </a:xfrm>
+          <a:prstGeom prst="line">
+            <a:avLst/>
+          </a:prstGeom>
+          <a:ln w="38100">
+            <a:solidFill>
+              <a:srgbClr val="C00000"/>
+            </a:solidFill>
+          </a:ln>
+        </p:spPr>
+        <p:style>
+          <a:lnRef idx="1">
+            <a:schemeClr val="accent1"/>
+          </a:lnRef>
+          <a:fillRef idx="0">
+            <a:schemeClr val="accent1"/>
+          </a:fillRef>
+          <a:effectRef idx="0">
+            <a:schemeClr val="accent1"/>
+          </a:effectRef>
+          <a:fontRef idx="minor">
+            <a:schemeClr val="tx1"/>
+          </a:fontRef>
+        </p:style>
+      </p:cxnSp>
+      <p:cxnSp>
+        <p:nvCxnSpPr>
+          <p:cNvPr id="34" name="Conector reto 33">
+            <a:extLst>
+              <a:ext uri="{FF2B5EF4-FFF2-40B4-BE49-F238E27FC236}">
+                <a16:creationId xmlns:a16="http://schemas.microsoft.com/office/drawing/2014/main" id="{F1E59883-9C12-3235-1FE9-F0B6642277D2}"/>
+              </a:ext>
+            </a:extLst>
+          </p:cNvPr>
+          <p:cNvCxnSpPr/>
+          <p:nvPr/>
+        </p:nvCxnSpPr>
+        <p:spPr>
+          <a:xfrm>
+            <a:off x="761576" y="2307814"/>
+            <a:ext cx="583096" cy="0"/>
+          </a:xfrm>
+          <a:prstGeom prst="line">
+            <a:avLst/>
+          </a:prstGeom>
+          <a:ln w="38100">
+            <a:solidFill>
+              <a:srgbClr val="C00000"/>
+            </a:solidFill>
+          </a:ln>
+        </p:spPr>
+        <p:style>
+          <a:lnRef idx="1">
+            <a:schemeClr val="accent1"/>
+          </a:lnRef>
+          <a:fillRef idx="0">
+            <a:schemeClr val="accent1"/>
+          </a:fillRef>
+          <a:effectRef idx="0">
+            <a:schemeClr val="accent1"/>
+          </a:effectRef>
+          <a:fontRef idx="minor">
+            <a:schemeClr val="tx1"/>
+          </a:fontRef>
+        </p:style>
+      </p:cxnSp>
+      <p:sp>
+        <p:nvSpPr>
+          <p:cNvPr id="35" name="CaixaDeTexto 34">
+            <a:extLst>
+              <a:ext uri="{FF2B5EF4-FFF2-40B4-BE49-F238E27FC236}">
+                <a16:creationId xmlns:a16="http://schemas.microsoft.com/office/drawing/2014/main" id="{F6D30638-05E7-139A-B35D-74A2D4916193}"/>
+              </a:ext>
+            </a:extLst>
+          </p:cNvPr>
+          <p:cNvSpPr txBox="1"/>
+          <p:nvPr/>
+        </p:nvSpPr>
+        <p:spPr>
+          <a:xfrm>
+            <a:off x="1338044" y="2128909"/>
+            <a:ext cx="3525077" cy="369332"/>
+          </a:xfrm>
+          <a:prstGeom prst="rect">
+            <a:avLst/>
+          </a:prstGeom>
+          <a:noFill/>
+        </p:spPr>
+        <p:txBody>
+          <a:bodyPr wrap="square" rtlCol="0">
+            <a:spAutoFit/>
+          </a:bodyPr>
+          <a:lstStyle/>
+          <a:p>
+            <a:r>
+              <a:rPr lang="pt-BR" dirty="0"/>
+              <a:t>Logo para login acessar site da Proz</a:t>
+            </a:r>
+          </a:p>
+        </p:txBody>
+      </p:sp>
+      <p:pic>
+        <p:nvPicPr>
+          <p:cNvPr id="43" name="Imagem 42">
+            <a:extLst>
+              <a:ext uri="{FF2B5EF4-FFF2-40B4-BE49-F238E27FC236}">
+                <a16:creationId xmlns:a16="http://schemas.microsoft.com/office/drawing/2014/main" id="{0501BED6-40D9-3D02-9C33-37F5C187E0F3}"/>
+              </a:ext>
+            </a:extLst>
+          </p:cNvPr>
+          <p:cNvPicPr>
+            <a:picLocks noChangeAspect="1"/>
+          </p:cNvPicPr>
+          <p:nvPr/>
+        </p:nvPicPr>
+        <p:blipFill rotWithShape="1">
+          <a:blip r:embed="rId2"/>
+          <a:srcRect l="46089"/>
+          <a:stretch/>
+        </p:blipFill>
+        <p:spPr>
+          <a:xfrm>
+            <a:off x="172928" y="3767891"/>
+            <a:ext cx="6181326" cy="1876425"/>
+          </a:xfrm>
+          <a:prstGeom prst="rect">
+            <a:avLst/>
+          </a:prstGeom>
+        </p:spPr>
+      </p:pic>
+      <p:cxnSp>
+        <p:nvCxnSpPr>
+          <p:cNvPr id="44" name="Conector reto 43">
+            <a:extLst>
+              <a:ext uri="{FF2B5EF4-FFF2-40B4-BE49-F238E27FC236}">
+                <a16:creationId xmlns:a16="http://schemas.microsoft.com/office/drawing/2014/main" id="{7E53A912-FAC0-2B43-B5C7-677E8DD53E78}"/>
+              </a:ext>
+            </a:extLst>
+          </p:cNvPr>
+          <p:cNvCxnSpPr>
+            <a:cxnSpLocks/>
+          </p:cNvCxnSpPr>
+          <p:nvPr/>
+        </p:nvCxnSpPr>
+        <p:spPr>
+          <a:xfrm>
+            <a:off x="4845147" y="3245176"/>
+            <a:ext cx="1108" cy="1640057"/>
+          </a:xfrm>
+          <a:prstGeom prst="line">
+            <a:avLst/>
+          </a:prstGeom>
+          <a:ln w="38100">
+            <a:solidFill>
+              <a:srgbClr val="C00000"/>
+            </a:solidFill>
+          </a:ln>
+        </p:spPr>
+        <p:style>
+          <a:lnRef idx="1">
+            <a:schemeClr val="accent1"/>
+          </a:lnRef>
+          <a:fillRef idx="0">
+            <a:schemeClr val="accent1"/>
+          </a:fillRef>
+          <a:effectRef idx="0">
+            <a:schemeClr val="accent1"/>
+          </a:effectRef>
+          <a:fontRef idx="minor">
+            <a:schemeClr val="tx1"/>
+          </a:fontRef>
+        </p:style>
+      </p:cxnSp>
+      <p:cxnSp>
+        <p:nvCxnSpPr>
+          <p:cNvPr id="46" name="Conector reto 45">
+            <a:extLst>
+              <a:ext uri="{FF2B5EF4-FFF2-40B4-BE49-F238E27FC236}">
+                <a16:creationId xmlns:a16="http://schemas.microsoft.com/office/drawing/2014/main" id="{4F29CB01-1664-432C-0D71-BF4A49F446D7}"/>
+              </a:ext>
+            </a:extLst>
+          </p:cNvPr>
+          <p:cNvCxnSpPr>
+            <a:cxnSpLocks/>
+          </p:cNvCxnSpPr>
+          <p:nvPr/>
+        </p:nvCxnSpPr>
+        <p:spPr>
+          <a:xfrm>
+            <a:off x="4845147" y="3245176"/>
+            <a:ext cx="599424" cy="0"/>
+          </a:xfrm>
+          <a:prstGeom prst="line">
+            <a:avLst/>
+          </a:prstGeom>
+          <a:ln w="38100">
+            <a:solidFill>
+              <a:srgbClr val="C00000"/>
+            </a:solidFill>
+          </a:ln>
+        </p:spPr>
+        <p:style>
+          <a:lnRef idx="1">
+            <a:schemeClr val="accent1"/>
+          </a:lnRef>
+          <a:fillRef idx="0">
+            <a:schemeClr val="accent1"/>
+          </a:fillRef>
+          <a:effectRef idx="0">
+            <a:schemeClr val="accent1"/>
+          </a:effectRef>
+          <a:fontRef idx="minor">
+            <a:schemeClr val="tx1"/>
+          </a:fontRef>
+        </p:style>
+      </p:cxnSp>
+      <p:sp>
+        <p:nvSpPr>
+          <p:cNvPr id="48" name="CaixaDeTexto 47">
+            <a:extLst>
+              <a:ext uri="{FF2B5EF4-FFF2-40B4-BE49-F238E27FC236}">
+                <a16:creationId xmlns:a16="http://schemas.microsoft.com/office/drawing/2014/main" id="{9D4C3577-BB90-B31D-2E53-7C88FE6BDABF}"/>
+              </a:ext>
+            </a:extLst>
+          </p:cNvPr>
+          <p:cNvSpPr txBox="1"/>
+          <p:nvPr/>
+        </p:nvSpPr>
+        <p:spPr>
+          <a:xfrm>
+            <a:off x="5412670" y="3053567"/>
+            <a:ext cx="4872771" cy="646331"/>
+          </a:xfrm>
+          <a:prstGeom prst="rect">
+            <a:avLst/>
+          </a:prstGeom>
+          <a:noFill/>
+        </p:spPr>
+        <p:txBody>
+          <a:bodyPr wrap="square" rtlCol="0">
+            <a:spAutoFit/>
+          </a:bodyPr>
+          <a:lstStyle/>
+          <a:p>
+            <a:pPr algn="just"/>
+            <a:r>
+              <a:rPr lang="pt-BR" dirty="0"/>
+              <a:t>Cabeçalho principal em uma cor diferente do cabeçalho secundário.</a:t>
+            </a:r>
+          </a:p>
+        </p:txBody>
+      </p:sp>
+      <p:cxnSp>
+        <p:nvCxnSpPr>
+          <p:cNvPr id="49" name="Conector reto 48">
+            <a:extLst>
+              <a:ext uri="{FF2B5EF4-FFF2-40B4-BE49-F238E27FC236}">
+                <a16:creationId xmlns:a16="http://schemas.microsoft.com/office/drawing/2014/main" id="{05DC451B-3C50-4C41-732C-8BBD4573114E}"/>
+              </a:ext>
+            </a:extLst>
+          </p:cNvPr>
+          <p:cNvCxnSpPr>
+            <a:cxnSpLocks/>
+          </p:cNvCxnSpPr>
+          <p:nvPr/>
+        </p:nvCxnSpPr>
+        <p:spPr>
+          <a:xfrm>
+            <a:off x="5205134" y="4562700"/>
+            <a:ext cx="0" cy="609066"/>
+          </a:xfrm>
+          <a:prstGeom prst="line">
+            <a:avLst/>
+          </a:prstGeom>
+          <a:ln w="38100">
+            <a:solidFill>
+              <a:srgbClr val="C00000"/>
+            </a:solidFill>
+          </a:ln>
+        </p:spPr>
+        <p:style>
+          <a:lnRef idx="1">
+            <a:schemeClr val="accent1"/>
+          </a:lnRef>
+          <a:fillRef idx="0">
+            <a:schemeClr val="accent1"/>
+          </a:fillRef>
+          <a:effectRef idx="0">
+            <a:schemeClr val="accent1"/>
+          </a:effectRef>
+          <a:fontRef idx="minor">
+            <a:schemeClr val="tx1"/>
+          </a:fontRef>
+        </p:style>
+      </p:cxnSp>
+      <p:cxnSp>
+        <p:nvCxnSpPr>
+          <p:cNvPr id="50" name="Conector reto 49">
+            <a:extLst>
+              <a:ext uri="{FF2B5EF4-FFF2-40B4-BE49-F238E27FC236}">
+                <a16:creationId xmlns:a16="http://schemas.microsoft.com/office/drawing/2014/main" id="{B295B51B-0099-86B5-6166-4CAFF9BC04E7}"/>
+              </a:ext>
+            </a:extLst>
+          </p:cNvPr>
+          <p:cNvCxnSpPr>
+            <a:cxnSpLocks/>
+          </p:cNvCxnSpPr>
+          <p:nvPr/>
+        </p:nvCxnSpPr>
+        <p:spPr>
+          <a:xfrm>
+            <a:off x="5204026" y="4562700"/>
+            <a:ext cx="1249271" cy="0"/>
+          </a:xfrm>
+          <a:prstGeom prst="line">
+            <a:avLst/>
+          </a:prstGeom>
+          <a:ln w="38100">
+            <a:solidFill>
+              <a:srgbClr val="C00000"/>
+            </a:solidFill>
+          </a:ln>
+        </p:spPr>
+        <p:style>
+          <a:lnRef idx="1">
+            <a:schemeClr val="accent1"/>
+          </a:lnRef>
+          <a:fillRef idx="0">
+            <a:schemeClr val="accent1"/>
+          </a:fillRef>
+          <a:effectRef idx="0">
+            <a:schemeClr val="accent1"/>
+          </a:effectRef>
+          <a:fontRef idx="minor">
+            <a:schemeClr val="tx1"/>
+          </a:fontRef>
+        </p:style>
+      </p:cxnSp>
+      <p:sp>
+        <p:nvSpPr>
+          <p:cNvPr id="51" name="CaixaDeTexto 50">
+            <a:extLst>
+              <a:ext uri="{FF2B5EF4-FFF2-40B4-BE49-F238E27FC236}">
+                <a16:creationId xmlns:a16="http://schemas.microsoft.com/office/drawing/2014/main" id="{E7FE7800-20A3-4D4E-A585-544509B240CE}"/>
+              </a:ext>
+            </a:extLst>
+          </p:cNvPr>
+          <p:cNvSpPr txBox="1"/>
+          <p:nvPr/>
+        </p:nvSpPr>
+        <p:spPr>
+          <a:xfrm>
+            <a:off x="6453297" y="4369047"/>
+            <a:ext cx="5457781" cy="1200329"/>
+          </a:xfrm>
+          <a:prstGeom prst="rect">
+            <a:avLst/>
+          </a:prstGeom>
+          <a:noFill/>
+        </p:spPr>
+        <p:txBody>
+          <a:bodyPr wrap="square" rtlCol="0">
+            <a:spAutoFit/>
+          </a:bodyPr>
+          <a:lstStyle/>
+          <a:p>
+            <a:pPr algn="just"/>
+            <a:r>
+              <a:rPr lang="pt-BR" dirty="0"/>
+              <a:t>Cabeçalho secundário descrevendo “Quem Somos”, “O que Fazemos” e “Nossos Objetivos”. Para cada item deste menu, ficar em uma página e está página ter a opção de voltar ao meu principal.</a:t>
+            </a:r>
+          </a:p>
+        </p:txBody>
+      </p:sp>
+      <p:sp>
+        <p:nvSpPr>
+          <p:cNvPr id="64" name="CaixaDeTexto 63">
+            <a:extLst>
+              <a:ext uri="{FF2B5EF4-FFF2-40B4-BE49-F238E27FC236}">
+                <a16:creationId xmlns:a16="http://schemas.microsoft.com/office/drawing/2014/main" id="{9BEF81A4-F90E-B066-589D-66E8336BDDA6}"/>
+              </a:ext>
+            </a:extLst>
+          </p:cNvPr>
+          <p:cNvSpPr txBox="1"/>
+          <p:nvPr/>
+        </p:nvSpPr>
+        <p:spPr>
+          <a:xfrm>
+            <a:off x="339213" y="5888401"/>
+            <a:ext cx="11571865" cy="646331"/>
+          </a:xfrm>
+          <a:prstGeom prst="rect">
+            <a:avLst/>
+          </a:prstGeom>
+          <a:noFill/>
+        </p:spPr>
+        <p:txBody>
+          <a:bodyPr wrap="square" rtlCol="0">
+            <a:spAutoFit/>
+          </a:bodyPr>
+          <a:lstStyle/>
+          <a:p>
+            <a:pPr algn="just"/>
+            <a:r>
+              <a:rPr lang="pt-BR" dirty="0"/>
+              <a:t>OBS: Cores, logos, plano de fundo e outros, podemos definir em grupo para futuro protótipo no Figma, que será o protótipo final. No Figma teremos tudo que será usado no projeto final.</a:t>
+            </a:r>
+          </a:p>
+        </p:txBody>
+      </p:sp>
+      <p:cxnSp>
+        <p:nvCxnSpPr>
+          <p:cNvPr id="65" name="Conector reto 64">
+            <a:extLst>
+              <a:ext uri="{FF2B5EF4-FFF2-40B4-BE49-F238E27FC236}">
+                <a16:creationId xmlns:a16="http://schemas.microsoft.com/office/drawing/2014/main" id="{FD865C2F-D555-E8C7-5F17-3967C7B9EF19}"/>
+              </a:ext>
+            </a:extLst>
+          </p:cNvPr>
+          <p:cNvCxnSpPr>
+            <a:cxnSpLocks/>
+          </p:cNvCxnSpPr>
+          <p:nvPr/>
+        </p:nvCxnSpPr>
+        <p:spPr>
+          <a:xfrm>
+            <a:off x="367665" y="2984636"/>
+            <a:ext cx="0" cy="1144912"/>
+          </a:xfrm>
+          <a:prstGeom prst="line">
+            <a:avLst/>
+          </a:prstGeom>
+          <a:ln w="38100">
+            <a:solidFill>
+              <a:srgbClr val="C00000"/>
+            </a:solidFill>
+          </a:ln>
+        </p:spPr>
+        <p:style>
+          <a:lnRef idx="1">
+            <a:schemeClr val="accent1"/>
+          </a:lnRef>
+          <a:fillRef idx="0">
+            <a:schemeClr val="accent1"/>
+          </a:fillRef>
+          <a:effectRef idx="0">
+            <a:schemeClr val="accent1"/>
+          </a:effectRef>
+          <a:fontRef idx="minor">
+            <a:schemeClr val="tx1"/>
+          </a:fontRef>
+        </p:style>
+      </p:cxnSp>
+      <p:cxnSp>
+        <p:nvCxnSpPr>
+          <p:cNvPr id="66" name="Conector reto 65">
+            <a:extLst>
+              <a:ext uri="{FF2B5EF4-FFF2-40B4-BE49-F238E27FC236}">
+                <a16:creationId xmlns:a16="http://schemas.microsoft.com/office/drawing/2014/main" id="{7AD4E675-F7FC-60BE-78B9-0004D4DC333C}"/>
+              </a:ext>
+            </a:extLst>
+          </p:cNvPr>
+          <p:cNvCxnSpPr>
+            <a:cxnSpLocks/>
+          </p:cNvCxnSpPr>
+          <p:nvPr/>
+        </p:nvCxnSpPr>
+        <p:spPr>
+          <a:xfrm>
+            <a:off x="366557" y="2984636"/>
+            <a:ext cx="198964" cy="0"/>
+          </a:xfrm>
+          <a:prstGeom prst="line">
+            <a:avLst/>
+          </a:prstGeom>
+          <a:ln w="38100">
+            <a:solidFill>
+              <a:srgbClr val="C00000"/>
+            </a:solidFill>
+          </a:ln>
+        </p:spPr>
+        <p:style>
+          <a:lnRef idx="1">
+            <a:schemeClr val="accent1"/>
+          </a:lnRef>
+          <a:fillRef idx="0">
+            <a:schemeClr val="accent1"/>
+          </a:fillRef>
+          <a:effectRef idx="0">
+            <a:schemeClr val="accent1"/>
+          </a:effectRef>
+          <a:fontRef idx="minor">
+            <a:schemeClr val="tx1"/>
+          </a:fontRef>
+        </p:style>
+      </p:cxnSp>
+      <p:sp>
+        <p:nvSpPr>
+          <p:cNvPr id="67" name="CaixaDeTexto 66">
+            <a:extLst>
+              <a:ext uri="{FF2B5EF4-FFF2-40B4-BE49-F238E27FC236}">
+                <a16:creationId xmlns:a16="http://schemas.microsoft.com/office/drawing/2014/main" id="{06704818-C4AE-B760-34C0-797FA18E5114}"/>
+              </a:ext>
+            </a:extLst>
+          </p:cNvPr>
+          <p:cNvSpPr txBox="1"/>
+          <p:nvPr/>
+        </p:nvSpPr>
+        <p:spPr>
+          <a:xfrm>
+            <a:off x="565521" y="2807775"/>
+            <a:ext cx="4050723" cy="1200329"/>
+          </a:xfrm>
+          <a:prstGeom prst="rect">
+            <a:avLst/>
+          </a:prstGeom>
+          <a:noFill/>
+        </p:spPr>
+        <p:txBody>
+          <a:bodyPr wrap="square" rtlCol="0">
+            <a:spAutoFit/>
+          </a:bodyPr>
+          <a:lstStyle/>
+          <a:p>
+            <a:pPr algn="just"/>
+            <a:r>
+              <a:rPr lang="pt-BR" dirty="0"/>
+              <a:t>Definir Tema Principal do Site. Este é um provisório. Se chegarmos ao um consenso, deixamos esse como definitivo.</a:t>
+            </a:r>
+          </a:p>
+        </p:txBody>
+      </p:sp>
+    </p:spTree>
+    <p:extLst>
+      <p:ext uri="{BB962C8B-B14F-4D97-AF65-F5344CB8AC3E}">
+        <p14:creationId xmlns:p14="http://schemas.microsoft.com/office/powerpoint/2010/main" val="1008950789"/>
+      </p:ext>
+    </p:extLst>
+  </p:cSld>
+  <p:clrMapOvr>
+    <a:masterClrMapping/>
+  </p:clrMapOvr>
+</p:sld>
+</file>
+
+<file path=ppt/slides/slide3.xml><?xml version="1.0" encoding="utf-8"?>
+<p:sld xmlns:a="http://schemas.openxmlformats.org/drawingml/2006/main" xmlns:r="http://schemas.openxmlformats.org/officeDocument/2006/relationships" xmlns:p="http://schemas.openxmlformats.org/presentationml/2006/main">
+  <p:cSld>
+    <p:spTree>
+      <p:nvGrpSpPr>
+        <p:cNvPr id="1" name="">
+          <a:extLst>
+            <a:ext uri="{FF2B5EF4-FFF2-40B4-BE49-F238E27FC236}">
+              <a16:creationId xmlns:a16="http://schemas.microsoft.com/office/drawing/2014/main" id="{04411C56-8D39-26CB-2804-26A01C507569}"/>
+            </a:ext>
+          </a:extLst>
+        </p:cNvPr>
+        <p:cNvGrpSpPr/>
+        <p:nvPr/>
+      </p:nvGrpSpPr>
+      <p:grpSpPr>
+        <a:xfrm>
+          <a:off x="0" y="0"/>
+          <a:ext cx="0" cy="0"/>
+          <a:chOff x="0" y="0"/>
+          <a:chExt cx="0" cy="0"/>
+        </a:xfrm>
+      </p:grpSpPr>
+      <p:grpSp>
+        <p:nvGrpSpPr>
+          <p:cNvPr id="6" name="Agrupar 5">
+            <a:extLst>
+              <a:ext uri="{FF2B5EF4-FFF2-40B4-BE49-F238E27FC236}">
+                <a16:creationId xmlns:a16="http://schemas.microsoft.com/office/drawing/2014/main" id="{415B3250-4726-234C-A731-1FC95EA86256}"/>
+              </a:ext>
+            </a:extLst>
+          </p:cNvPr>
+          <p:cNvGrpSpPr/>
+          <p:nvPr/>
+        </p:nvGrpSpPr>
+        <p:grpSpPr>
+          <a:xfrm>
+            <a:off x="498989" y="2358075"/>
+            <a:ext cx="8480323" cy="2929222"/>
+            <a:chOff x="0" y="1878752"/>
+            <a:chExt cx="12192000" cy="4362991"/>
+          </a:xfrm>
+        </p:grpSpPr>
+        <p:pic>
+          <p:nvPicPr>
+            <p:cNvPr id="47" name="Picture 2">
+              <a:extLst>
+                <a:ext uri="{FF2B5EF4-FFF2-40B4-BE49-F238E27FC236}">
+                  <a16:creationId xmlns:a16="http://schemas.microsoft.com/office/drawing/2014/main" id="{91186FAD-34FE-F0C1-00C8-A8D59B0AA931}"/>
+                </a:ext>
+              </a:extLst>
+            </p:cNvPr>
+            <p:cNvPicPr>
+              <a:picLocks noChangeAspect="1" noChangeArrowheads="1"/>
+            </p:cNvPicPr>
+            <p:nvPr/>
+          </p:nvPicPr>
+          <p:blipFill>
+            <a:blip r:embed="rId2">
+              <a:extLst>
+                <a:ext uri="{28A0092B-C50C-407E-A947-70E740481C1C}">
+                  <a14:useLocalDpi xmlns:a14="http://schemas.microsoft.com/office/drawing/2010/main" val="0"/>
+                </a:ext>
+              </a:extLst>
+            </a:blip>
+            <a:srcRect/>
+            <a:stretch>
+              <a:fillRect/>
+            </a:stretch>
+          </p:blipFill>
+          <p:spPr bwMode="auto">
+            <a:xfrm>
+              <a:off x="0" y="1878752"/>
+              <a:ext cx="12192000" cy="4362991"/>
+            </a:xfrm>
+            <a:prstGeom prst="rect">
+              <a:avLst/>
+            </a:prstGeom>
+            <a:noFill/>
+            <a:extLst>
+              <a:ext uri="{909E8E84-426E-40DD-AFC4-6F175D3DCCD1}">
+                <a14:hiddenFill xmlns:a14="http://schemas.microsoft.com/office/drawing/2010/main">
+                  <a:solidFill>
+                    <a:srgbClr val="FFFFFF"/>
+                  </a:solidFill>
+                </a14:hiddenFill>
+              </a:ext>
+            </a:extLst>
+          </p:spPr>
+        </p:pic>
+        <p:sp>
+          <p:nvSpPr>
+            <p:cNvPr id="18" name="CaixaDeTexto 17">
+              <a:extLst>
+                <a:ext uri="{FF2B5EF4-FFF2-40B4-BE49-F238E27FC236}">
+                  <a16:creationId xmlns:a16="http://schemas.microsoft.com/office/drawing/2014/main" id="{1DBD6F36-649F-1CEB-4EC3-66B56B36C3FA}"/>
+                </a:ext>
+              </a:extLst>
+            </p:cNvPr>
+            <p:cNvSpPr txBox="1"/>
+            <p:nvPr/>
+          </p:nvSpPr>
+          <p:spPr>
+            <a:xfrm>
+              <a:off x="107390" y="2062869"/>
+              <a:ext cx="7744797" cy="3970318"/>
+            </a:xfrm>
+            <a:prstGeom prst="rect">
+              <a:avLst/>
+            </a:prstGeom>
+            <a:noFill/>
+          </p:spPr>
+          <p:txBody>
+            <a:bodyPr wrap="square" rtlCol="0">
+              <a:spAutoFit/>
+            </a:bodyPr>
+            <a:lstStyle/>
+            <a:p>
+              <a:pPr algn="just"/>
+              <a:r>
+                <a:rPr lang="pt-BR" dirty="0"/>
+                <a:t>"Lorem ipsum dolor sit amet, consectetur adipiscing elit, sed do eiusmod tempor incididunt ut labore et dolore magna aliqua. Ut enim ad minim veniam, quis nostrud exercitation ullamco laboris nisi ut aliquip ex ea commodo consequat. Duis aute irure dolor in reprehenderit in voluptate velit esse cillum dolore eu fugiat nulla pariatur. Excepteur sint occaecat cupidatat non proident, sunt in culpa qui officia deserunt mollit anim id est laborum."</a:t>
+              </a:r>
+            </a:p>
+          </p:txBody>
+        </p:sp>
+        <p:grpSp>
+          <p:nvGrpSpPr>
+            <p:cNvPr id="39" name="Agrupar 38">
+              <a:extLst>
+                <a:ext uri="{FF2B5EF4-FFF2-40B4-BE49-F238E27FC236}">
+                  <a16:creationId xmlns:a16="http://schemas.microsoft.com/office/drawing/2014/main" id="{9167D1E9-F4AA-4F63-E533-DA80217C3DD4}"/>
+                </a:ext>
+              </a:extLst>
+            </p:cNvPr>
+            <p:cNvGrpSpPr/>
+            <p:nvPr/>
+          </p:nvGrpSpPr>
+          <p:grpSpPr>
+            <a:xfrm>
+              <a:off x="8075522" y="2135714"/>
+              <a:ext cx="3823335" cy="3849068"/>
+              <a:chOff x="6028392" y="2146032"/>
+              <a:chExt cx="3823335" cy="3849068"/>
+            </a:xfrm>
+          </p:grpSpPr>
+          <p:pic>
+            <p:nvPicPr>
+              <p:cNvPr id="28" name="Imagem 27">
+                <a:extLst>
+                  <a:ext uri="{FF2B5EF4-FFF2-40B4-BE49-F238E27FC236}">
+                    <a16:creationId xmlns:a16="http://schemas.microsoft.com/office/drawing/2014/main" id="{70830235-F8FF-A8D4-0169-E5AF6C32B62E}"/>
+                  </a:ext>
+                </a:extLst>
+              </p:cNvPr>
+              <p:cNvPicPr>
+                <a:picLocks noChangeAspect="1"/>
+              </p:cNvPicPr>
+              <p:nvPr/>
+            </p:nvPicPr>
+            <p:blipFill>
+              <a:blip r:embed="rId3">
+                <a:extLst>
+                  <a:ext uri="{28A0092B-C50C-407E-A947-70E740481C1C}">
+                    <a14:useLocalDpi xmlns:a14="http://schemas.microsoft.com/office/drawing/2010/main" val="0"/>
+                  </a:ext>
+                </a:extLst>
+              </a:blip>
+              <a:stretch>
+                <a:fillRect/>
+              </a:stretch>
+            </p:blipFill>
+            <p:spPr>
+              <a:xfrm>
+                <a:off x="6028392" y="2148455"/>
+                <a:ext cx="1800000" cy="1800000"/>
+              </a:xfrm>
+              <a:prstGeom prst="rect">
+                <a:avLst/>
+              </a:prstGeom>
+            </p:spPr>
+          </p:pic>
+          <p:pic>
+            <p:nvPicPr>
+              <p:cNvPr id="30" name="Imagem 29">
+                <a:extLst>
+                  <a:ext uri="{FF2B5EF4-FFF2-40B4-BE49-F238E27FC236}">
+                    <a16:creationId xmlns:a16="http://schemas.microsoft.com/office/drawing/2014/main" id="{00240B0C-D899-0C4E-07AE-2FA74DA9203A}"/>
+                  </a:ext>
+                </a:extLst>
+              </p:cNvPr>
+              <p:cNvPicPr>
+                <a:picLocks noChangeAspect="1"/>
+              </p:cNvPicPr>
+              <p:nvPr/>
+            </p:nvPicPr>
+            <p:blipFill>
+              <a:blip r:embed="rId4">
+                <a:extLst>
+                  <a:ext uri="{28A0092B-C50C-407E-A947-70E740481C1C}">
+                    <a14:useLocalDpi xmlns:a14="http://schemas.microsoft.com/office/drawing/2010/main" val="0"/>
+                  </a:ext>
+                </a:extLst>
+              </a:blip>
+              <a:stretch>
+                <a:fillRect/>
+              </a:stretch>
+            </p:blipFill>
+            <p:spPr>
+              <a:xfrm>
+                <a:off x="8051727" y="2146032"/>
+                <a:ext cx="1800000" cy="1800000"/>
+              </a:xfrm>
+              <a:prstGeom prst="rect">
+                <a:avLst/>
+              </a:prstGeom>
+            </p:spPr>
+          </p:pic>
+          <p:pic>
+            <p:nvPicPr>
+              <p:cNvPr id="36" name="Imagem 35">
+                <a:extLst>
+                  <a:ext uri="{FF2B5EF4-FFF2-40B4-BE49-F238E27FC236}">
+                    <a16:creationId xmlns:a16="http://schemas.microsoft.com/office/drawing/2014/main" id="{89BDAC85-16BB-0B20-97FE-D23D804E831F}"/>
+                  </a:ext>
+                </a:extLst>
+              </p:cNvPr>
+              <p:cNvPicPr>
+                <a:picLocks noChangeAspect="1"/>
+              </p:cNvPicPr>
+              <p:nvPr/>
+            </p:nvPicPr>
+            <p:blipFill>
+              <a:blip r:embed="rId5">
+                <a:extLst>
+                  <a:ext uri="{28A0092B-C50C-407E-A947-70E740481C1C}">
+                    <a14:useLocalDpi xmlns:a14="http://schemas.microsoft.com/office/drawing/2010/main" val="0"/>
+                  </a:ext>
+                </a:extLst>
+              </a:blip>
+              <a:stretch>
+                <a:fillRect/>
+              </a:stretch>
+            </p:blipFill>
+            <p:spPr>
+              <a:xfrm>
+                <a:off x="6028392" y="4195100"/>
+                <a:ext cx="1800000" cy="1800000"/>
+              </a:xfrm>
+              <a:prstGeom prst="rect">
+                <a:avLst/>
+              </a:prstGeom>
+            </p:spPr>
+          </p:pic>
+          <p:pic>
+            <p:nvPicPr>
+              <p:cNvPr id="37" name="Imagem 36">
+                <a:extLst>
+                  <a:ext uri="{FF2B5EF4-FFF2-40B4-BE49-F238E27FC236}">
+                    <a16:creationId xmlns:a16="http://schemas.microsoft.com/office/drawing/2014/main" id="{B0AB5DEA-C93A-028E-C398-15E65CC18C08}"/>
+                  </a:ext>
+                </a:extLst>
+              </p:cNvPr>
+              <p:cNvPicPr>
+                <a:picLocks noChangeAspect="1"/>
+              </p:cNvPicPr>
+              <p:nvPr/>
+            </p:nvPicPr>
+            <p:blipFill>
+              <a:blip r:embed="rId6">
+                <a:extLst>
+                  <a:ext uri="{28A0092B-C50C-407E-A947-70E740481C1C}">
+                    <a14:useLocalDpi xmlns:a14="http://schemas.microsoft.com/office/drawing/2010/main" val="0"/>
+                  </a:ext>
+                </a:extLst>
+              </a:blip>
+              <a:stretch>
+                <a:fillRect/>
+              </a:stretch>
+            </p:blipFill>
+            <p:spPr>
+              <a:xfrm>
+                <a:off x="8051727" y="4172043"/>
+                <a:ext cx="1800000" cy="1800000"/>
+              </a:xfrm>
+              <a:prstGeom prst="rect">
+                <a:avLst/>
+              </a:prstGeom>
+            </p:spPr>
+          </p:pic>
+        </p:grpSp>
+      </p:grpSp>
+      <p:cxnSp>
+        <p:nvCxnSpPr>
+          <p:cNvPr id="9" name="Conector reto 8">
+            <a:extLst>
+              <a:ext uri="{FF2B5EF4-FFF2-40B4-BE49-F238E27FC236}">
+                <a16:creationId xmlns:a16="http://schemas.microsoft.com/office/drawing/2014/main" id="{2CCA547D-71E9-E935-F287-DA23CAA30FD5}"/>
+              </a:ext>
+            </a:extLst>
+          </p:cNvPr>
+          <p:cNvCxnSpPr>
+            <a:cxnSpLocks/>
+          </p:cNvCxnSpPr>
+          <p:nvPr/>
+        </p:nvCxnSpPr>
+        <p:spPr>
+          <a:xfrm>
+            <a:off x="829763" y="5114779"/>
+            <a:ext cx="0" cy="545197"/>
+          </a:xfrm>
+          <a:prstGeom prst="line">
+            <a:avLst/>
+          </a:prstGeom>
+          <a:ln w="38100">
+            <a:solidFill>
+              <a:srgbClr val="C00000"/>
+            </a:solidFill>
+          </a:ln>
+        </p:spPr>
+        <p:style>
+          <a:lnRef idx="1">
+            <a:schemeClr val="accent1"/>
+          </a:lnRef>
+          <a:fillRef idx="0">
+            <a:schemeClr val="accent1"/>
+          </a:fillRef>
+          <a:effectRef idx="0">
+            <a:schemeClr val="accent1"/>
+          </a:effectRef>
+          <a:fontRef idx="minor">
+            <a:schemeClr val="tx1"/>
+          </a:fontRef>
+        </p:style>
+      </p:cxnSp>
+      <p:cxnSp>
+        <p:nvCxnSpPr>
+          <p:cNvPr id="11" name="Conector reto 10">
+            <a:extLst>
+              <a:ext uri="{FF2B5EF4-FFF2-40B4-BE49-F238E27FC236}">
+                <a16:creationId xmlns:a16="http://schemas.microsoft.com/office/drawing/2014/main" id="{C52EAD5F-8FA8-C9B7-3121-04452B3C151C}"/>
+              </a:ext>
+            </a:extLst>
+          </p:cNvPr>
+          <p:cNvCxnSpPr/>
+          <p:nvPr/>
+        </p:nvCxnSpPr>
+        <p:spPr>
+          <a:xfrm>
+            <a:off x="829763" y="5659976"/>
+            <a:ext cx="583096" cy="0"/>
+          </a:xfrm>
+          <a:prstGeom prst="line">
+            <a:avLst/>
+          </a:prstGeom>
+          <a:ln w="38100">
+            <a:solidFill>
+              <a:srgbClr val="C00000"/>
+            </a:solidFill>
+          </a:ln>
+        </p:spPr>
+        <p:style>
+          <a:lnRef idx="1">
+            <a:schemeClr val="accent1"/>
+          </a:lnRef>
+          <a:fillRef idx="0">
+            <a:schemeClr val="accent1"/>
+          </a:fillRef>
+          <a:effectRef idx="0">
+            <a:schemeClr val="accent1"/>
+          </a:effectRef>
+          <a:fontRef idx="minor">
+            <a:schemeClr val="tx1"/>
+          </a:fontRef>
+        </p:style>
+      </p:cxnSp>
+      <p:sp>
+        <p:nvSpPr>
+          <p:cNvPr id="15" name="CaixaDeTexto 14">
+            <a:extLst>
+              <a:ext uri="{FF2B5EF4-FFF2-40B4-BE49-F238E27FC236}">
+                <a16:creationId xmlns:a16="http://schemas.microsoft.com/office/drawing/2014/main" id="{C2D41A41-8D56-D1F5-25A4-6351B5DBFCF1}"/>
+              </a:ext>
+            </a:extLst>
+          </p:cNvPr>
+          <p:cNvSpPr txBox="1"/>
+          <p:nvPr/>
+        </p:nvSpPr>
+        <p:spPr>
+          <a:xfrm>
+            <a:off x="1406232" y="5481071"/>
+            <a:ext cx="3332920" cy="646331"/>
+          </a:xfrm>
+          <a:prstGeom prst="rect">
+            <a:avLst/>
+          </a:prstGeom>
+          <a:noFill/>
+        </p:spPr>
+        <p:txBody>
+          <a:bodyPr wrap="square" rtlCol="0">
+            <a:spAutoFit/>
+          </a:bodyPr>
+          <a:lstStyle/>
+          <a:p>
+            <a:pPr algn="just"/>
+            <a:r>
+              <a:rPr lang="pt-BR" dirty="0"/>
+              <a:t>Podemos definir uma imagem de fundo ou uma cor. </a:t>
+            </a:r>
+          </a:p>
+        </p:txBody>
+      </p:sp>
+      <p:cxnSp>
+        <p:nvCxnSpPr>
+          <p:cNvPr id="17" name="Conector reto 16">
+            <a:extLst>
+              <a:ext uri="{FF2B5EF4-FFF2-40B4-BE49-F238E27FC236}">
+                <a16:creationId xmlns:a16="http://schemas.microsoft.com/office/drawing/2014/main" id="{59268E13-F5B6-812D-7EDC-4816F06B3F79}"/>
+              </a:ext>
+            </a:extLst>
+          </p:cNvPr>
+          <p:cNvCxnSpPr>
+            <a:cxnSpLocks/>
+          </p:cNvCxnSpPr>
+          <p:nvPr/>
+        </p:nvCxnSpPr>
+        <p:spPr>
+          <a:xfrm>
+            <a:off x="303730" y="4205296"/>
+            <a:ext cx="0" cy="2062768"/>
+          </a:xfrm>
+          <a:prstGeom prst="line">
+            <a:avLst/>
+          </a:prstGeom>
+          <a:ln w="38100">
+            <a:solidFill>
+              <a:srgbClr val="C00000"/>
+            </a:solidFill>
+          </a:ln>
+        </p:spPr>
+        <p:style>
+          <a:lnRef idx="1">
+            <a:schemeClr val="accent1"/>
+          </a:lnRef>
+          <a:fillRef idx="0">
+            <a:schemeClr val="accent1"/>
+          </a:fillRef>
+          <a:effectRef idx="0">
+            <a:schemeClr val="accent1"/>
+          </a:effectRef>
+          <a:fontRef idx="minor">
+            <a:schemeClr val="tx1"/>
+          </a:fontRef>
+        </p:style>
+      </p:cxnSp>
+      <p:cxnSp>
+        <p:nvCxnSpPr>
+          <p:cNvPr id="19" name="Conector reto 18">
+            <a:extLst>
+              <a:ext uri="{FF2B5EF4-FFF2-40B4-BE49-F238E27FC236}">
+                <a16:creationId xmlns:a16="http://schemas.microsoft.com/office/drawing/2014/main" id="{48443022-5073-2989-ABC1-12E92A8CFA3C}"/>
+              </a:ext>
+            </a:extLst>
+          </p:cNvPr>
+          <p:cNvCxnSpPr>
+            <a:cxnSpLocks/>
+          </p:cNvCxnSpPr>
+          <p:nvPr/>
+        </p:nvCxnSpPr>
+        <p:spPr>
+          <a:xfrm>
+            <a:off x="303730" y="4221556"/>
+            <a:ext cx="418944" cy="0"/>
+          </a:xfrm>
+          <a:prstGeom prst="line">
+            <a:avLst/>
+          </a:prstGeom>
+          <a:ln w="38100">
+            <a:solidFill>
+              <a:srgbClr val="C00000"/>
+            </a:solidFill>
+          </a:ln>
+        </p:spPr>
+        <p:style>
+          <a:lnRef idx="1">
+            <a:schemeClr val="accent1"/>
+          </a:lnRef>
+          <a:fillRef idx="0">
+            <a:schemeClr val="accent1"/>
+          </a:fillRef>
+          <a:effectRef idx="0">
+            <a:schemeClr val="accent1"/>
+          </a:effectRef>
+          <a:fontRef idx="minor">
+            <a:schemeClr val="tx1"/>
+          </a:fontRef>
+        </p:style>
+      </p:cxnSp>
+      <p:cxnSp>
+        <p:nvCxnSpPr>
+          <p:cNvPr id="22" name="Conector reto 21">
+            <a:extLst>
+              <a:ext uri="{FF2B5EF4-FFF2-40B4-BE49-F238E27FC236}">
+                <a16:creationId xmlns:a16="http://schemas.microsoft.com/office/drawing/2014/main" id="{26DA153E-FC43-017A-F2F4-51EFF1EAEABE}"/>
+              </a:ext>
+            </a:extLst>
+          </p:cNvPr>
+          <p:cNvCxnSpPr/>
+          <p:nvPr/>
+        </p:nvCxnSpPr>
+        <p:spPr>
+          <a:xfrm>
+            <a:off x="303730" y="6268064"/>
+            <a:ext cx="583096" cy="0"/>
+          </a:xfrm>
+          <a:prstGeom prst="line">
+            <a:avLst/>
+          </a:prstGeom>
+          <a:ln w="38100">
+            <a:solidFill>
+              <a:srgbClr val="C00000"/>
+            </a:solidFill>
+          </a:ln>
+        </p:spPr>
+        <p:style>
+          <a:lnRef idx="1">
+            <a:schemeClr val="accent1"/>
+          </a:lnRef>
+          <a:fillRef idx="0">
+            <a:schemeClr val="accent1"/>
+          </a:fillRef>
+          <a:effectRef idx="0">
+            <a:schemeClr val="accent1"/>
+          </a:effectRef>
+          <a:fontRef idx="minor">
+            <a:schemeClr val="tx1"/>
+          </a:fontRef>
+        </p:style>
+      </p:cxnSp>
+      <p:sp>
+        <p:nvSpPr>
+          <p:cNvPr id="25" name="CaixaDeTexto 24">
+            <a:extLst>
+              <a:ext uri="{FF2B5EF4-FFF2-40B4-BE49-F238E27FC236}">
+                <a16:creationId xmlns:a16="http://schemas.microsoft.com/office/drawing/2014/main" id="{CE75B66F-6639-333D-5850-118938869A3A}"/>
+              </a:ext>
+            </a:extLst>
+          </p:cNvPr>
+          <p:cNvSpPr txBox="1"/>
+          <p:nvPr/>
+        </p:nvSpPr>
+        <p:spPr>
+          <a:xfrm>
+            <a:off x="886826" y="6088479"/>
+            <a:ext cx="3332920" cy="646331"/>
+          </a:xfrm>
+          <a:prstGeom prst="rect">
+            <a:avLst/>
+          </a:prstGeom>
+          <a:noFill/>
+        </p:spPr>
+        <p:txBody>
+          <a:bodyPr wrap="square" rtlCol="0">
+            <a:spAutoFit/>
+          </a:bodyPr>
+          <a:lstStyle/>
+          <a:p>
+            <a:pPr algn="just"/>
+            <a:r>
+              <a:rPr lang="pt-BR" dirty="0"/>
+              <a:t>Texto introdutório, explicando sobre o assunto abordado.</a:t>
+            </a:r>
+          </a:p>
+        </p:txBody>
+      </p:sp>
+      <p:cxnSp>
+        <p:nvCxnSpPr>
+          <p:cNvPr id="32" name="Conector reto 31">
+            <a:extLst>
+              <a:ext uri="{FF2B5EF4-FFF2-40B4-BE49-F238E27FC236}">
+                <a16:creationId xmlns:a16="http://schemas.microsoft.com/office/drawing/2014/main" id="{745C7B18-E813-0AAF-C8AB-B69615AB8FF9}"/>
+              </a:ext>
+            </a:extLst>
+          </p:cNvPr>
+          <p:cNvCxnSpPr>
+            <a:cxnSpLocks/>
+          </p:cNvCxnSpPr>
+          <p:nvPr/>
+        </p:nvCxnSpPr>
+        <p:spPr>
+          <a:xfrm>
+            <a:off x="6231310" y="1239828"/>
+            <a:ext cx="0" cy="1350015"/>
+          </a:xfrm>
+          <a:prstGeom prst="line">
+            <a:avLst/>
+          </a:prstGeom>
+          <a:ln w="38100">
+            <a:solidFill>
+              <a:srgbClr val="C00000"/>
+            </a:solidFill>
+          </a:ln>
+        </p:spPr>
+        <p:style>
+          <a:lnRef idx="1">
+            <a:schemeClr val="accent1"/>
+          </a:lnRef>
+          <a:fillRef idx="0">
+            <a:schemeClr val="accent1"/>
+          </a:fillRef>
+          <a:effectRef idx="0">
+            <a:schemeClr val="accent1"/>
+          </a:effectRef>
+          <a:fontRef idx="minor">
+            <a:schemeClr val="tx1"/>
+          </a:fontRef>
+        </p:style>
+      </p:cxnSp>
+      <p:cxnSp>
+        <p:nvCxnSpPr>
+          <p:cNvPr id="33" name="Conector reto 32">
+            <a:extLst>
+              <a:ext uri="{FF2B5EF4-FFF2-40B4-BE49-F238E27FC236}">
+                <a16:creationId xmlns:a16="http://schemas.microsoft.com/office/drawing/2014/main" id="{2B5D5208-6F79-46C7-03D3-4E5CCA47EA07}"/>
+              </a:ext>
+            </a:extLst>
+          </p:cNvPr>
+          <p:cNvCxnSpPr>
+            <a:cxnSpLocks/>
+          </p:cNvCxnSpPr>
+          <p:nvPr/>
+        </p:nvCxnSpPr>
+        <p:spPr>
+          <a:xfrm>
+            <a:off x="6231310" y="1239828"/>
+            <a:ext cx="482595" cy="0"/>
+          </a:xfrm>
+          <a:prstGeom prst="line">
+            <a:avLst/>
+          </a:prstGeom>
+          <a:ln w="38100">
+            <a:solidFill>
+              <a:srgbClr val="C00000"/>
+            </a:solidFill>
+          </a:ln>
+        </p:spPr>
+        <p:style>
+          <a:lnRef idx="1">
+            <a:schemeClr val="accent1"/>
+          </a:lnRef>
+          <a:fillRef idx="0">
+            <a:schemeClr val="accent1"/>
+          </a:fillRef>
+          <a:effectRef idx="0">
+            <a:schemeClr val="accent1"/>
+          </a:effectRef>
+          <a:fontRef idx="minor">
+            <a:schemeClr val="tx1"/>
+          </a:fontRef>
+        </p:style>
+      </p:cxnSp>
+      <p:sp>
+        <p:nvSpPr>
+          <p:cNvPr id="34" name="CaixaDeTexto 33">
+            <a:extLst>
+              <a:ext uri="{FF2B5EF4-FFF2-40B4-BE49-F238E27FC236}">
+                <a16:creationId xmlns:a16="http://schemas.microsoft.com/office/drawing/2014/main" id="{B8A6B883-374C-6EEB-D878-9154201F33C1}"/>
+              </a:ext>
+            </a:extLst>
+          </p:cNvPr>
+          <p:cNvSpPr txBox="1"/>
+          <p:nvPr/>
+        </p:nvSpPr>
+        <p:spPr>
+          <a:xfrm>
+            <a:off x="6798833" y="782755"/>
+            <a:ext cx="5165906" cy="923330"/>
+          </a:xfrm>
+          <a:prstGeom prst="rect">
+            <a:avLst/>
+          </a:prstGeom>
+          <a:noFill/>
+        </p:spPr>
+        <p:txBody>
+          <a:bodyPr wrap="square" rtlCol="0">
+            <a:spAutoFit/>
+          </a:bodyPr>
+          <a:lstStyle/>
+          <a:p>
+            <a:pPr algn="just"/>
+            <a:r>
+              <a:rPr lang="pt-BR" dirty="0"/>
+              <a:t>O combate a Fome e Agricultura sustentável é a base dos outros objetivos. Pessoas com fome não fazem nada.</a:t>
+            </a:r>
+          </a:p>
+        </p:txBody>
+      </p:sp>
+      <p:sp>
+        <p:nvSpPr>
+          <p:cNvPr id="40" name="CaixaDeTexto 39">
+            <a:extLst>
+              <a:ext uri="{FF2B5EF4-FFF2-40B4-BE49-F238E27FC236}">
+                <a16:creationId xmlns:a16="http://schemas.microsoft.com/office/drawing/2014/main" id="{21874EC0-7830-7285-B0B3-B08FE045D5BE}"/>
+              </a:ext>
+            </a:extLst>
+          </p:cNvPr>
+          <p:cNvSpPr txBox="1"/>
+          <p:nvPr/>
+        </p:nvSpPr>
+        <p:spPr>
+          <a:xfrm>
+            <a:off x="595278" y="324772"/>
+            <a:ext cx="5288920" cy="1938992"/>
+          </a:xfrm>
+          <a:prstGeom prst="rect">
+            <a:avLst/>
+          </a:prstGeom>
+          <a:noFill/>
+        </p:spPr>
+        <p:txBody>
+          <a:bodyPr wrap="square" rtlCol="0">
+            <a:spAutoFit/>
+          </a:bodyPr>
+          <a:lstStyle/>
+          <a:p>
+            <a:pPr algn="just"/>
+            <a:r>
+              <a:rPr lang="pt-BR" sz="2400" dirty="0"/>
+              <a:t>Esses são os objetivos que escolhemos e que, acreditamos que tenha uma certa ligação.</a:t>
+            </a:r>
+          </a:p>
+          <a:p>
+            <a:pPr algn="just"/>
+            <a:r>
+              <a:rPr lang="pt-BR" sz="2400" dirty="0"/>
+              <a:t>Cada ícone dos itens escolhidos, levaram o usuário a explicação do tema.</a:t>
+            </a:r>
+          </a:p>
+        </p:txBody>
+      </p:sp>
+      <p:cxnSp>
+        <p:nvCxnSpPr>
+          <p:cNvPr id="41" name="Conector reto 40">
+            <a:extLst>
+              <a:ext uri="{FF2B5EF4-FFF2-40B4-BE49-F238E27FC236}">
+                <a16:creationId xmlns:a16="http://schemas.microsoft.com/office/drawing/2014/main" id="{A2F8B412-0338-F63D-4C6F-BA60B900849A}"/>
+              </a:ext>
+            </a:extLst>
+          </p:cNvPr>
+          <p:cNvCxnSpPr>
+            <a:cxnSpLocks/>
+          </p:cNvCxnSpPr>
+          <p:nvPr/>
+        </p:nvCxnSpPr>
+        <p:spPr>
+          <a:xfrm>
+            <a:off x="7622572" y="1893673"/>
+            <a:ext cx="1108" cy="696170"/>
+          </a:xfrm>
+          <a:prstGeom prst="line">
+            <a:avLst/>
+          </a:prstGeom>
+          <a:ln w="38100">
+            <a:solidFill>
+              <a:srgbClr val="C00000"/>
+            </a:solidFill>
+          </a:ln>
+        </p:spPr>
+        <p:style>
+          <a:lnRef idx="1">
+            <a:schemeClr val="accent1"/>
+          </a:lnRef>
+          <a:fillRef idx="0">
+            <a:schemeClr val="accent1"/>
+          </a:fillRef>
+          <a:effectRef idx="0">
+            <a:schemeClr val="accent1"/>
+          </a:effectRef>
+          <a:fontRef idx="minor">
+            <a:schemeClr val="tx1"/>
+          </a:fontRef>
+        </p:style>
+      </p:cxnSp>
+      <p:cxnSp>
+        <p:nvCxnSpPr>
+          <p:cNvPr id="42" name="Conector reto 41">
+            <a:extLst>
+              <a:ext uri="{FF2B5EF4-FFF2-40B4-BE49-F238E27FC236}">
+                <a16:creationId xmlns:a16="http://schemas.microsoft.com/office/drawing/2014/main" id="{B09EE8E0-1342-9D96-9DA6-A8BC8F362CD2}"/>
+              </a:ext>
+            </a:extLst>
+          </p:cNvPr>
+          <p:cNvCxnSpPr>
+            <a:cxnSpLocks/>
+          </p:cNvCxnSpPr>
+          <p:nvPr/>
+        </p:nvCxnSpPr>
+        <p:spPr>
+          <a:xfrm>
+            <a:off x="7622572" y="1893673"/>
+            <a:ext cx="482595" cy="0"/>
+          </a:xfrm>
+          <a:prstGeom prst="line">
+            <a:avLst/>
+          </a:prstGeom>
+          <a:ln w="38100">
+            <a:solidFill>
+              <a:srgbClr val="C00000"/>
+            </a:solidFill>
+          </a:ln>
+        </p:spPr>
+        <p:style>
+          <a:lnRef idx="1">
+            <a:schemeClr val="accent1"/>
+          </a:lnRef>
+          <a:fillRef idx="0">
+            <a:schemeClr val="accent1"/>
+          </a:fillRef>
+          <a:effectRef idx="0">
+            <a:schemeClr val="accent1"/>
+          </a:effectRef>
+          <a:fontRef idx="minor">
+            <a:schemeClr val="tx1"/>
+          </a:fontRef>
+        </p:style>
+      </p:cxnSp>
+      <p:sp>
+        <p:nvSpPr>
+          <p:cNvPr id="43" name="CaixaDeTexto 42">
+            <a:extLst>
+              <a:ext uri="{FF2B5EF4-FFF2-40B4-BE49-F238E27FC236}">
+                <a16:creationId xmlns:a16="http://schemas.microsoft.com/office/drawing/2014/main" id="{C1A3703D-D697-7DAD-64D6-5B127A584F66}"/>
+              </a:ext>
+            </a:extLst>
+          </p:cNvPr>
+          <p:cNvSpPr txBox="1"/>
+          <p:nvPr/>
+        </p:nvSpPr>
+        <p:spPr>
+          <a:xfrm>
+            <a:off x="8190095" y="1436600"/>
+            <a:ext cx="3095111" cy="923330"/>
+          </a:xfrm>
+          <a:prstGeom prst="rect">
+            <a:avLst/>
+          </a:prstGeom>
+          <a:noFill/>
+        </p:spPr>
+        <p:txBody>
+          <a:bodyPr wrap="square" rtlCol="0">
+            <a:spAutoFit/>
+          </a:bodyPr>
+          <a:lstStyle/>
+          <a:p>
+            <a:pPr algn="just"/>
+            <a:r>
+              <a:rPr lang="pt-BR" dirty="0"/>
+              <a:t>As pessoas com uma base alimentar, vai gerar bem estar e conseguir se desenvolver.</a:t>
+            </a:r>
+          </a:p>
+        </p:txBody>
+      </p:sp>
+      <p:cxnSp>
+        <p:nvCxnSpPr>
+          <p:cNvPr id="50" name="Conector reto 49">
+            <a:extLst>
+              <a:ext uri="{FF2B5EF4-FFF2-40B4-BE49-F238E27FC236}">
+                <a16:creationId xmlns:a16="http://schemas.microsoft.com/office/drawing/2014/main" id="{59E19653-FE90-92B1-ADA9-CA92D6C6AC25}"/>
+              </a:ext>
+            </a:extLst>
+          </p:cNvPr>
+          <p:cNvCxnSpPr>
+            <a:cxnSpLocks/>
+          </p:cNvCxnSpPr>
+          <p:nvPr/>
+        </p:nvCxnSpPr>
+        <p:spPr>
+          <a:xfrm>
+            <a:off x="4923622" y="5655387"/>
+            <a:ext cx="482595" cy="0"/>
+          </a:xfrm>
+          <a:prstGeom prst="line">
+            <a:avLst/>
+          </a:prstGeom>
+          <a:ln w="38100">
+            <a:solidFill>
+              <a:srgbClr val="C00000"/>
+            </a:solidFill>
+          </a:ln>
+        </p:spPr>
+        <p:style>
+          <a:lnRef idx="1">
+            <a:schemeClr val="accent1"/>
+          </a:lnRef>
+          <a:fillRef idx="0">
+            <a:schemeClr val="accent1"/>
+          </a:fillRef>
+          <a:effectRef idx="0">
+            <a:schemeClr val="accent1"/>
+          </a:effectRef>
+          <a:fontRef idx="minor">
+            <a:schemeClr val="tx1"/>
+          </a:fontRef>
+        </p:style>
+      </p:cxnSp>
+      <p:sp>
+        <p:nvSpPr>
+          <p:cNvPr id="51" name="CaixaDeTexto 50">
+            <a:extLst>
+              <a:ext uri="{FF2B5EF4-FFF2-40B4-BE49-F238E27FC236}">
+                <a16:creationId xmlns:a16="http://schemas.microsoft.com/office/drawing/2014/main" id="{7CC15CC6-420E-3B21-5EBE-EB752FAC660D}"/>
+              </a:ext>
+            </a:extLst>
+          </p:cNvPr>
+          <p:cNvSpPr txBox="1"/>
+          <p:nvPr/>
+        </p:nvSpPr>
+        <p:spPr>
+          <a:xfrm>
+            <a:off x="5361973" y="5459816"/>
+            <a:ext cx="5956020" cy="1200329"/>
+          </a:xfrm>
+          <a:prstGeom prst="rect">
+            <a:avLst/>
+          </a:prstGeom>
+          <a:noFill/>
+        </p:spPr>
+        <p:txBody>
+          <a:bodyPr wrap="square" rtlCol="0">
+            <a:spAutoFit/>
+          </a:bodyPr>
+          <a:lstStyle/>
+          <a:p>
+            <a:pPr algn="just"/>
+            <a:r>
+              <a:rPr lang="pt-BR" dirty="0"/>
+              <a:t>As pessoas com os dois itens anteriores, poderão se desenvolver através da Educação de Qualidade. Estudos comprovam quem tem um nível de educação melhor, tem uma qualidade de vida melhor também.</a:t>
+            </a:r>
+          </a:p>
+        </p:txBody>
+      </p:sp>
+      <p:cxnSp>
+        <p:nvCxnSpPr>
+          <p:cNvPr id="53" name="Conector reto 52">
+            <a:extLst>
+              <a:ext uri="{FF2B5EF4-FFF2-40B4-BE49-F238E27FC236}">
+                <a16:creationId xmlns:a16="http://schemas.microsoft.com/office/drawing/2014/main" id="{73CEF13C-E45B-A951-B174-908EFCF2637A}"/>
+              </a:ext>
+            </a:extLst>
+          </p:cNvPr>
+          <p:cNvCxnSpPr>
+            <a:cxnSpLocks/>
+          </p:cNvCxnSpPr>
+          <p:nvPr/>
+        </p:nvCxnSpPr>
+        <p:spPr>
+          <a:xfrm>
+            <a:off x="4923622" y="4813859"/>
+            <a:ext cx="0" cy="846117"/>
+          </a:xfrm>
+          <a:prstGeom prst="line">
+            <a:avLst/>
+          </a:prstGeom>
+          <a:ln w="38100">
+            <a:solidFill>
+              <a:srgbClr val="C00000"/>
+            </a:solidFill>
+          </a:ln>
+        </p:spPr>
+        <p:style>
+          <a:lnRef idx="1">
+            <a:schemeClr val="accent1"/>
+          </a:lnRef>
+          <a:fillRef idx="0">
+            <a:schemeClr val="accent1"/>
+          </a:fillRef>
+          <a:effectRef idx="0">
+            <a:schemeClr val="accent1"/>
+          </a:effectRef>
+          <a:fontRef idx="minor">
+            <a:schemeClr val="tx1"/>
+          </a:fontRef>
+        </p:style>
+      </p:cxnSp>
+      <p:cxnSp>
+        <p:nvCxnSpPr>
+          <p:cNvPr id="54" name="Conector reto 53">
+            <a:extLst>
+              <a:ext uri="{FF2B5EF4-FFF2-40B4-BE49-F238E27FC236}">
+                <a16:creationId xmlns:a16="http://schemas.microsoft.com/office/drawing/2014/main" id="{D50D55B3-AE29-E4C0-6BEF-FF77862BDDB3}"/>
+              </a:ext>
+            </a:extLst>
+          </p:cNvPr>
+          <p:cNvCxnSpPr>
+            <a:cxnSpLocks/>
+          </p:cNvCxnSpPr>
+          <p:nvPr/>
+        </p:nvCxnSpPr>
+        <p:spPr>
+          <a:xfrm>
+            <a:off x="4911213" y="4808298"/>
+            <a:ext cx="1334845" cy="0"/>
+          </a:xfrm>
+          <a:prstGeom prst="line">
+            <a:avLst/>
+          </a:prstGeom>
+          <a:ln w="38100">
+            <a:solidFill>
+              <a:srgbClr val="C00000"/>
+            </a:solidFill>
+          </a:ln>
+        </p:spPr>
+        <p:style>
+          <a:lnRef idx="1">
+            <a:schemeClr val="accent1"/>
+          </a:lnRef>
+          <a:fillRef idx="0">
+            <a:schemeClr val="accent1"/>
+          </a:fillRef>
+          <a:effectRef idx="0">
+            <a:schemeClr val="accent1"/>
+          </a:effectRef>
+          <a:fontRef idx="minor">
+            <a:schemeClr val="tx1"/>
+          </a:fontRef>
+        </p:style>
+      </p:cxnSp>
+      <p:cxnSp>
+        <p:nvCxnSpPr>
+          <p:cNvPr id="57" name="Conector reto 56">
+            <a:extLst>
+              <a:ext uri="{FF2B5EF4-FFF2-40B4-BE49-F238E27FC236}">
+                <a16:creationId xmlns:a16="http://schemas.microsoft.com/office/drawing/2014/main" id="{46D09EE7-E1C7-0E3C-444D-9D2ABD820E27}"/>
+              </a:ext>
+            </a:extLst>
+          </p:cNvPr>
+          <p:cNvCxnSpPr>
+            <a:cxnSpLocks/>
+          </p:cNvCxnSpPr>
+          <p:nvPr/>
+        </p:nvCxnSpPr>
+        <p:spPr>
+          <a:xfrm flipV="1">
+            <a:off x="8350150" y="3906296"/>
+            <a:ext cx="784506" cy="12827"/>
+          </a:xfrm>
+          <a:prstGeom prst="line">
+            <a:avLst/>
+          </a:prstGeom>
+          <a:ln w="38100">
+            <a:solidFill>
+              <a:srgbClr val="C00000"/>
+            </a:solidFill>
+          </a:ln>
+        </p:spPr>
+        <p:style>
+          <a:lnRef idx="1">
+            <a:schemeClr val="accent1"/>
+          </a:lnRef>
+          <a:fillRef idx="0">
+            <a:schemeClr val="accent1"/>
+          </a:fillRef>
+          <a:effectRef idx="0">
+            <a:schemeClr val="accent1"/>
+          </a:effectRef>
+          <a:fontRef idx="minor">
+            <a:schemeClr val="tx1"/>
+          </a:fontRef>
+        </p:style>
+      </p:cxnSp>
+      <p:sp>
+        <p:nvSpPr>
+          <p:cNvPr id="58" name="CaixaDeTexto 57">
+            <a:extLst>
+              <a:ext uri="{FF2B5EF4-FFF2-40B4-BE49-F238E27FC236}">
+                <a16:creationId xmlns:a16="http://schemas.microsoft.com/office/drawing/2014/main" id="{C27CD215-BB79-324E-38A5-8116CDB218C8}"/>
+              </a:ext>
+            </a:extLst>
+          </p:cNvPr>
+          <p:cNvSpPr txBox="1"/>
+          <p:nvPr/>
+        </p:nvSpPr>
+        <p:spPr>
+          <a:xfrm>
+            <a:off x="9059289" y="3739077"/>
+            <a:ext cx="3035453" cy="1200329"/>
+          </a:xfrm>
+          <a:prstGeom prst="rect">
+            <a:avLst/>
+          </a:prstGeom>
+          <a:noFill/>
+        </p:spPr>
+        <p:txBody>
+          <a:bodyPr wrap="square" rtlCol="0">
+            <a:spAutoFit/>
+          </a:bodyPr>
+          <a:lstStyle/>
+          <a:p>
+            <a:pPr algn="just"/>
+            <a:r>
+              <a:rPr lang="pt-BR" dirty="0"/>
+              <a:t>Pessoas esclarecidas e com conhecimento, ajudarão na Ação Contra a Mudança Global.</a:t>
+            </a:r>
+          </a:p>
+        </p:txBody>
+      </p:sp>
+    </p:spTree>
+    <p:extLst>
+      <p:ext uri="{BB962C8B-B14F-4D97-AF65-F5344CB8AC3E}">
+        <p14:creationId xmlns:p14="http://schemas.microsoft.com/office/powerpoint/2010/main" val="3024218324"/>
+      </p:ext>
+    </p:extLst>
+  </p:cSld>
+  <p:clrMapOvr>
+    <a:masterClrMapping/>
+  </p:clrMapOvr>
+</p:sld>
+</file>
+
+<file path=ppt/slides/slide4.xml><?xml version="1.0" encoding="utf-8"?>
+<p:sld xmlns:a="http://schemas.openxmlformats.org/drawingml/2006/main" xmlns:r="http://schemas.openxmlformats.org/officeDocument/2006/relationships" xmlns:p="http://schemas.openxmlformats.org/presentationml/2006/main">
+  <p:cSld>
+    <p:spTree>
+      <p:nvGrpSpPr>
+        <p:cNvPr id="1" name="">
+          <a:extLst>
+            <a:ext uri="{FF2B5EF4-FFF2-40B4-BE49-F238E27FC236}">
+              <a16:creationId xmlns:a16="http://schemas.microsoft.com/office/drawing/2014/main" id="{A210D982-404B-EE37-C1F8-65457D6316AA}"/>
+            </a:ext>
+          </a:extLst>
+        </p:cNvPr>
+        <p:cNvGrpSpPr/>
+        <p:nvPr/>
+      </p:nvGrpSpPr>
+      <p:grpSpPr>
+        <a:xfrm>
+          <a:off x="0" y="0"/>
+          <a:ext cx="0" cy="0"/>
+          <a:chOff x="0" y="0"/>
+          <a:chExt cx="0" cy="0"/>
+        </a:xfrm>
+      </p:grpSpPr>
+      <p:pic>
+        <p:nvPicPr>
+          <p:cNvPr id="3" name="Imagem 2">
+            <a:extLst>
+              <a:ext uri="{FF2B5EF4-FFF2-40B4-BE49-F238E27FC236}">
+                <a16:creationId xmlns:a16="http://schemas.microsoft.com/office/drawing/2014/main" id="{9C504AFC-7A38-4091-797C-9503F4E48DCE}"/>
+              </a:ext>
+            </a:extLst>
+          </p:cNvPr>
+          <p:cNvPicPr>
+            <a:picLocks noChangeAspect="1"/>
+          </p:cNvPicPr>
+          <p:nvPr/>
+        </p:nvPicPr>
+        <p:blipFill rotWithShape="1">
+          <a:blip r:embed="rId2"/>
+          <a:srcRect l="1005"/>
+          <a:stretch/>
+        </p:blipFill>
+        <p:spPr>
+          <a:xfrm>
+            <a:off x="1242712" y="572728"/>
+            <a:ext cx="9806117" cy="857865"/>
+          </a:xfrm>
+          <a:prstGeom prst="rect">
+            <a:avLst/>
+          </a:prstGeom>
+        </p:spPr>
+      </p:pic>
+      <p:cxnSp>
+        <p:nvCxnSpPr>
+          <p:cNvPr id="8" name="Conector reto 7">
+            <a:extLst>
+              <a:ext uri="{FF2B5EF4-FFF2-40B4-BE49-F238E27FC236}">
+                <a16:creationId xmlns:a16="http://schemas.microsoft.com/office/drawing/2014/main" id="{B55D975A-4229-A1F4-FA7B-B4A3B9F76CBC}"/>
+              </a:ext>
+            </a:extLst>
+          </p:cNvPr>
+          <p:cNvCxnSpPr>
+            <a:cxnSpLocks/>
+          </p:cNvCxnSpPr>
+          <p:nvPr/>
+        </p:nvCxnSpPr>
+        <p:spPr>
+          <a:xfrm>
+            <a:off x="834664" y="1019641"/>
+            <a:ext cx="0" cy="735419"/>
+          </a:xfrm>
+          <a:prstGeom prst="line">
+            <a:avLst/>
+          </a:prstGeom>
+          <a:ln w="38100">
+            <a:solidFill>
+              <a:srgbClr val="C00000"/>
+            </a:solidFill>
+          </a:ln>
+        </p:spPr>
+        <p:style>
+          <a:lnRef idx="1">
+            <a:schemeClr val="accent1"/>
+          </a:lnRef>
+          <a:fillRef idx="0">
+            <a:schemeClr val="accent1"/>
+          </a:fillRef>
+          <a:effectRef idx="0">
+            <a:schemeClr val="accent1"/>
+          </a:effectRef>
+          <a:fontRef idx="minor">
+            <a:schemeClr val="tx1"/>
+          </a:fontRef>
+        </p:style>
+      </p:cxnSp>
+      <p:cxnSp>
+        <p:nvCxnSpPr>
+          <p:cNvPr id="10" name="Conector reto 9">
+            <a:extLst>
+              <a:ext uri="{FF2B5EF4-FFF2-40B4-BE49-F238E27FC236}">
+                <a16:creationId xmlns:a16="http://schemas.microsoft.com/office/drawing/2014/main" id="{63A452AF-72A2-282B-8373-0399672F159D}"/>
+              </a:ext>
+            </a:extLst>
+          </p:cNvPr>
+          <p:cNvCxnSpPr>
+            <a:cxnSpLocks/>
+          </p:cNvCxnSpPr>
+          <p:nvPr/>
+        </p:nvCxnSpPr>
+        <p:spPr>
+          <a:xfrm>
+            <a:off x="834664" y="1035901"/>
+            <a:ext cx="418944" cy="0"/>
+          </a:xfrm>
+          <a:prstGeom prst="line">
+            <a:avLst/>
+          </a:prstGeom>
+          <a:ln w="38100">
+            <a:solidFill>
+              <a:srgbClr val="C00000"/>
+            </a:solidFill>
+          </a:ln>
+        </p:spPr>
+        <p:style>
+          <a:lnRef idx="1">
+            <a:schemeClr val="accent1"/>
+          </a:lnRef>
+          <a:fillRef idx="0">
+            <a:schemeClr val="accent1"/>
+          </a:fillRef>
+          <a:effectRef idx="0">
+            <a:schemeClr val="accent1"/>
+          </a:effectRef>
+          <a:fontRef idx="minor">
+            <a:schemeClr val="tx1"/>
+          </a:fontRef>
+        </p:style>
+      </p:cxnSp>
+      <p:cxnSp>
+        <p:nvCxnSpPr>
+          <p:cNvPr id="12" name="Conector reto 11">
+            <a:extLst>
+              <a:ext uri="{FF2B5EF4-FFF2-40B4-BE49-F238E27FC236}">
+                <a16:creationId xmlns:a16="http://schemas.microsoft.com/office/drawing/2014/main" id="{F0E6E788-2576-0664-68E3-ABBDACEA1A65}"/>
+              </a:ext>
+            </a:extLst>
+          </p:cNvPr>
+          <p:cNvCxnSpPr/>
+          <p:nvPr/>
+        </p:nvCxnSpPr>
+        <p:spPr>
+          <a:xfrm>
+            <a:off x="834664" y="1755060"/>
+            <a:ext cx="583096" cy="0"/>
+          </a:xfrm>
+          <a:prstGeom prst="line">
+            <a:avLst/>
+          </a:prstGeom>
+          <a:ln w="38100">
+            <a:solidFill>
+              <a:srgbClr val="C00000"/>
+            </a:solidFill>
+          </a:ln>
+        </p:spPr>
+        <p:style>
+          <a:lnRef idx="1">
+            <a:schemeClr val="accent1"/>
+          </a:lnRef>
+          <a:fillRef idx="0">
+            <a:schemeClr val="accent1"/>
+          </a:fillRef>
+          <a:effectRef idx="0">
+            <a:schemeClr val="accent1"/>
+          </a:effectRef>
+          <a:fontRef idx="minor">
+            <a:schemeClr val="tx1"/>
+          </a:fontRef>
+        </p:style>
+      </p:cxnSp>
+      <p:sp>
+        <p:nvSpPr>
+          <p:cNvPr id="13" name="CaixaDeTexto 12">
+            <a:extLst>
+              <a:ext uri="{FF2B5EF4-FFF2-40B4-BE49-F238E27FC236}">
+                <a16:creationId xmlns:a16="http://schemas.microsoft.com/office/drawing/2014/main" id="{A5BC542D-A741-A8A7-6DB6-B9B016424B7D}"/>
+              </a:ext>
+            </a:extLst>
+          </p:cNvPr>
+          <p:cNvSpPr txBox="1"/>
+          <p:nvPr/>
+        </p:nvSpPr>
+        <p:spPr>
+          <a:xfrm>
+            <a:off x="1417759" y="1575475"/>
+            <a:ext cx="3935905" cy="2308324"/>
+          </a:xfrm>
+          <a:prstGeom prst="rect">
+            <a:avLst/>
+          </a:prstGeom>
+          <a:noFill/>
+        </p:spPr>
+        <p:txBody>
+          <a:bodyPr wrap="square" rtlCol="0">
+            <a:spAutoFit/>
+          </a:bodyPr>
+          <a:lstStyle/>
+          <a:p>
+            <a:pPr algn="just"/>
+            <a:r>
+              <a:rPr lang="pt-BR" dirty="0"/>
+              <a:t>No rodapé, colocar um logo do Instagram e os componentes do grupo, que é um link individual de cada componente.</a:t>
+            </a:r>
+          </a:p>
+          <a:p>
+            <a:pPr algn="just"/>
+            <a:endParaRPr lang="pt-BR" dirty="0"/>
+          </a:p>
+          <a:p>
+            <a:pPr algn="just"/>
+            <a:r>
+              <a:rPr lang="pt-BR" dirty="0"/>
+              <a:t>Ou se for o caso, podemos colocar o Github de cada um, que dará acesso ao nosso projeto.</a:t>
+            </a:r>
+          </a:p>
+        </p:txBody>
+      </p:sp>
+    </p:spTree>
+    <p:extLst>
+      <p:ext uri="{BB962C8B-B14F-4D97-AF65-F5344CB8AC3E}">
+        <p14:creationId xmlns:p14="http://schemas.microsoft.com/office/powerpoint/2010/main" val="87261565"/>
       </p:ext>
     </p:extLst>
   </p:cSld>

</xml_diff>